<commit_message>
modificica alla presentazione e print pdf
</commit_message>
<xml_diff>
--- a/presentazione progetto.pptx
+++ b/presentazione progetto.pptx
@@ -269,7 +269,7 @@
       </p:grpSpPr>
       <p:sp>
         <p:nvSpPr>
-          <p:cNvPr id="757604726" name="Google Shape;3;n"/>
+          <p:cNvPr id="1202753212" name="Google Shape;3;n"/>
           <p:cNvSpPr/>
           <p:nvPr>
             <p:ph type="sldImg" idx="2"/>
@@ -318,7 +318,7 @@
       </p:sp>
       <p:sp>
         <p:nvSpPr>
-          <p:cNvPr id="1437306373" name="Google Shape;4;n"/>
+          <p:cNvPr id="991513322" name="Google Shape;4;n"/>
           <p:cNvSpPr txBox="1"/>
           <p:nvPr>
             <p:ph type="body" idx="1"/>
@@ -695,7 +695,7 @@
       </p:grpSpPr>
       <p:sp>
         <p:nvSpPr>
-          <p:cNvPr id="724172847" name="Google Shape;95;g4dfce81f19_0_45:notes"/>
+          <p:cNvPr id="1266243107" name="Google Shape;95;g4dfce81f19_0_45:notes"/>
           <p:cNvSpPr/>
           <p:nvPr>
             <p:ph type="sldImg" idx="2"/>
@@ -734,7 +734,7 @@
       </p:sp>
       <p:sp>
         <p:nvSpPr>
-          <p:cNvPr id="1986960515" name="Google Shape;96;g4dfce81f19_0_45:notes"/>
+          <p:cNvPr id="1653836564" name="Google Shape;96;g4dfce81f19_0_45:notes"/>
           <p:cNvSpPr txBox="1"/>
           <p:nvPr>
             <p:ph type="body" idx="1"/>
@@ -796,7 +796,7 @@
       </p:grpSpPr>
       <p:sp>
         <p:nvSpPr>
-          <p:cNvPr id="469288105" name="Google Shape;130;g339bffbd1fc_5_4:notes"/>
+          <p:cNvPr id="1231805437" name="Google Shape;130;g339bffbd1fc_5_4:notes"/>
           <p:cNvSpPr/>
           <p:nvPr>
             <p:ph type="sldImg" idx="2"/>
@@ -835,7 +835,7 @@
       </p:sp>
       <p:sp>
         <p:nvSpPr>
-          <p:cNvPr id="801169480" name="Google Shape;131;g339bffbd1fc_5_4:notes"/>
+          <p:cNvPr id="1288139116" name="Google Shape;131;g339bffbd1fc_5_4:notes"/>
           <p:cNvSpPr txBox="1"/>
           <p:nvPr>
             <p:ph type="body" idx="1"/>
@@ -851,7 +851,7 @@
           </a:prstGeom>
         </p:spPr>
         <p:txBody>
-          <a:bodyPr spcFirstLastPara="1" wrap="square" lIns="91424" tIns="91424" rIns="91424" bIns="91424" anchor="t" anchorCtr="0">
+          <a:bodyPr spcFirstLastPara="1" wrap="square" lIns="91423" tIns="91423" rIns="91423" bIns="91423" anchor="t" anchorCtr="0">
             <a:noAutofit/>
           </a:bodyPr>
           <a:lstStyle/>
@@ -897,7 +897,7 @@
       </p:grpSpPr>
       <p:sp>
         <p:nvSpPr>
-          <p:cNvPr id="2054129322" name="Google Shape;103;g339bffbd1fc_0_503:notes"/>
+          <p:cNvPr id="1202466529" name="Google Shape;103;g339bffbd1fc_0_503:notes"/>
           <p:cNvSpPr/>
           <p:nvPr>
             <p:ph type="sldImg" idx="2"/>
@@ -936,7 +936,7 @@
       </p:sp>
       <p:sp>
         <p:nvSpPr>
-          <p:cNvPr id="1399469817" name="Google Shape;104;g339bffbd1fc_0_503:notes"/>
+          <p:cNvPr id="163255612" name="Google Shape;104;g339bffbd1fc_0_503:notes"/>
           <p:cNvSpPr txBox="1"/>
           <p:nvPr>
             <p:ph type="body" idx="1"/>
@@ -952,7 +952,7 @@
           </a:prstGeom>
         </p:spPr>
         <p:txBody>
-          <a:bodyPr spcFirstLastPara="1" wrap="square" lIns="91424" tIns="91424" rIns="91424" bIns="91424" anchor="t" anchorCtr="0">
+          <a:bodyPr spcFirstLastPara="1" wrap="square" lIns="91423" tIns="91423" rIns="91423" bIns="91423" anchor="t" anchorCtr="0">
             <a:noAutofit/>
           </a:bodyPr>
           <a:lstStyle/>
@@ -998,7 +998,7 @@
       </p:grpSpPr>
       <p:sp>
         <p:nvSpPr>
-          <p:cNvPr id="411556121" name="Google Shape;130;g339bffbd1fc_5_4:notes"/>
+          <p:cNvPr id="776013286" name="Google Shape;130;g339bffbd1fc_5_4:notes"/>
           <p:cNvSpPr/>
           <p:nvPr>
             <p:ph type="sldImg" idx="2"/>
@@ -1037,7 +1037,7 @@
       </p:sp>
       <p:sp>
         <p:nvSpPr>
-          <p:cNvPr id="1909891697" name="Google Shape;131;g339bffbd1fc_5_4:notes"/>
+          <p:cNvPr id="298417887" name="Google Shape;131;g339bffbd1fc_5_4:notes"/>
           <p:cNvSpPr txBox="1"/>
           <p:nvPr>
             <p:ph type="body" idx="1"/>
@@ -1053,7 +1053,7 @@
           </a:prstGeom>
         </p:spPr>
         <p:txBody>
-          <a:bodyPr spcFirstLastPara="1" wrap="square" lIns="91424" tIns="91424" rIns="91424" bIns="91424" anchor="t" anchorCtr="0">
+          <a:bodyPr spcFirstLastPara="1" wrap="square" lIns="91423" tIns="91423" rIns="91423" bIns="91423" anchor="t" anchorCtr="0">
             <a:noAutofit/>
           </a:bodyPr>
           <a:lstStyle/>
@@ -1099,7 +1099,7 @@
       </p:grpSpPr>
       <p:sp>
         <p:nvSpPr>
-          <p:cNvPr id="168873343" name="Google Shape;103;g339bffbd1fc_0_503:notes"/>
+          <p:cNvPr id="700900462" name="Google Shape;103;g339bffbd1fc_0_503:notes"/>
           <p:cNvSpPr/>
           <p:nvPr>
             <p:ph type="sldImg" idx="2"/>
@@ -1138,7 +1138,7 @@
       </p:sp>
       <p:sp>
         <p:nvSpPr>
-          <p:cNvPr id="1858786348" name="Google Shape;104;g339bffbd1fc_0_503:notes"/>
+          <p:cNvPr id="2092583598" name="Google Shape;104;g339bffbd1fc_0_503:notes"/>
           <p:cNvSpPr txBox="1"/>
           <p:nvPr>
             <p:ph type="body" idx="1"/>
@@ -1154,7 +1154,7 @@
           </a:prstGeom>
         </p:spPr>
         <p:txBody>
-          <a:bodyPr spcFirstLastPara="1" wrap="square" lIns="91424" tIns="91424" rIns="91424" bIns="91424" anchor="t" anchorCtr="0">
+          <a:bodyPr spcFirstLastPara="1" wrap="square" lIns="91423" tIns="91423" rIns="91423" bIns="91423" anchor="t" anchorCtr="0">
             <a:noAutofit/>
           </a:bodyPr>
           <a:lstStyle/>
@@ -1200,7 +1200,7 @@
       </p:grpSpPr>
       <p:sp>
         <p:nvSpPr>
-          <p:cNvPr id="1843314109" name="Google Shape;103;g339bffbd1fc_0_503:notes"/>
+          <p:cNvPr id="463585348" name="Google Shape;103;g339bffbd1fc_0_503:notes"/>
           <p:cNvSpPr/>
           <p:nvPr>
             <p:ph type="sldImg" idx="2"/>
@@ -1239,7 +1239,7 @@
       </p:sp>
       <p:sp>
         <p:nvSpPr>
-          <p:cNvPr id="716596886" name="Google Shape;104;g339bffbd1fc_0_503:notes"/>
+          <p:cNvPr id="933071427" name="Google Shape;104;g339bffbd1fc_0_503:notes"/>
           <p:cNvSpPr txBox="1"/>
           <p:nvPr>
             <p:ph type="body" idx="1"/>
@@ -1255,7 +1255,7 @@
           </a:prstGeom>
         </p:spPr>
         <p:txBody>
-          <a:bodyPr spcFirstLastPara="1" wrap="square" lIns="91424" tIns="91424" rIns="91424" bIns="91424" anchor="t" anchorCtr="0">
+          <a:bodyPr spcFirstLastPara="1" wrap="square" lIns="91423" tIns="91423" rIns="91423" bIns="91423" anchor="t" anchorCtr="0">
             <a:noAutofit/>
           </a:bodyPr>
           <a:lstStyle/>
@@ -1270,6 +1270,44 @@
               <a:buNone/>
               <a:defRPr/>
             </a:pPr>
+            <a:r>
+              <a:rPr lang="it-IT"/>
+              <a:t>- hidden-state = rappresentazione astratta del token mask assegnata dal modello </a:t>
+            </a:r>
+            <a:endParaRPr lang="it-IT"/>
+          </a:p>
+          <a:p>
+            <a:pPr marL="0" lvl="0" indent="0" algn="l" rtl="0">
+              <a:spcBef>
+                <a:spcPts val="0"/>
+              </a:spcBef>
+              <a:spcAft>
+                <a:spcPts val="0"/>
+              </a:spcAft>
+              <a:buNone/>
+              <a:defRPr/>
+            </a:pPr>
+            <a:endParaRPr lang="it-IT"/>
+          </a:p>
+          <a:p>
+            <a:pPr marL="0" lvl="0" indent="0" algn="l" rtl="0">
+              <a:spcBef>
+                <a:spcPts val="0"/>
+              </a:spcBef>
+              <a:spcAft>
+                <a:spcPts val="0"/>
+              </a:spcAft>
+              <a:buNone/>
+              <a:defRPr/>
+            </a:pPr>
+            <a:r>
+              <a:rPr lang="it-IT"/>
+              <a:t>- logits = voto da 0 ad 1 (probabilità) che il modello assegna ad ogni parola del vocabolario </a:t>
+            </a:r>
+            <a:r>
+              <a:rPr lang="it-IT"/>
+              <a:t>affinchè questa possa sostituire il token mask</a:t>
+            </a:r>
             <a:endParaRPr/>
           </a:p>
         </p:txBody>
@@ -1301,7 +1339,7 @@
       </p:grpSpPr>
       <p:sp>
         <p:nvSpPr>
-          <p:cNvPr id="1011297814" name="Google Shape;103;g339bffbd1fc_0_503:notes"/>
+          <p:cNvPr id="885905572" name="Google Shape;103;g339bffbd1fc_0_503:notes"/>
           <p:cNvSpPr/>
           <p:nvPr>
             <p:ph type="sldImg" idx="2"/>
@@ -1340,7 +1378,7 @@
       </p:sp>
       <p:sp>
         <p:nvSpPr>
-          <p:cNvPr id="1343800593" name="Google Shape;104;g339bffbd1fc_0_503:notes"/>
+          <p:cNvPr id="1280702967" name="Google Shape;104;g339bffbd1fc_0_503:notes"/>
           <p:cNvSpPr txBox="1"/>
           <p:nvPr>
             <p:ph type="body" idx="1"/>
@@ -1356,7 +1394,7 @@
           </a:prstGeom>
         </p:spPr>
         <p:txBody>
-          <a:bodyPr spcFirstLastPara="1" wrap="square" lIns="91424" tIns="91424" rIns="91424" bIns="91424" anchor="t" anchorCtr="0">
+          <a:bodyPr spcFirstLastPara="1" wrap="square" lIns="91423" tIns="91423" rIns="91423" bIns="91423" anchor="t" anchorCtr="0">
             <a:noAutofit/>
           </a:bodyPr>
           <a:lstStyle/>
@@ -1421,7 +1459,7 @@
       </p:grpSpPr>
       <p:sp>
         <p:nvSpPr>
-          <p:cNvPr id="800875596" name="Google Shape;130;g339bffbd1fc_5_4:notes"/>
+          <p:cNvPr id="1394993876" name="Google Shape;130;g339bffbd1fc_5_4:notes"/>
           <p:cNvSpPr/>
           <p:nvPr>
             <p:ph type="sldImg" idx="2"/>
@@ -1460,7 +1498,7 @@
       </p:sp>
       <p:sp>
         <p:nvSpPr>
-          <p:cNvPr id="1812473034" name="Google Shape;131;g339bffbd1fc_5_4:notes"/>
+          <p:cNvPr id="673303337" name="Google Shape;131;g339bffbd1fc_5_4:notes"/>
           <p:cNvSpPr txBox="1"/>
           <p:nvPr>
             <p:ph type="body" idx="1"/>
@@ -1476,7 +1514,7 @@
           </a:prstGeom>
         </p:spPr>
         <p:txBody>
-          <a:bodyPr spcFirstLastPara="1" wrap="square" lIns="91424" tIns="91424" rIns="91424" bIns="91424" anchor="t" anchorCtr="0">
+          <a:bodyPr spcFirstLastPara="1" wrap="square" lIns="91423" tIns="91423" rIns="91423" bIns="91423" anchor="t" anchorCtr="0">
             <a:noAutofit/>
           </a:bodyPr>
           <a:lstStyle/>
@@ -1522,7 +1560,7 @@
       </p:grpSpPr>
       <p:sp>
         <p:nvSpPr>
-          <p:cNvPr id="358283593" name="Google Shape;161;g339bffbd1fc_0_597:notes"/>
+          <p:cNvPr id="280048582" name="Google Shape;161;g339bffbd1fc_0_597:notes"/>
           <p:cNvSpPr/>
           <p:nvPr>
             <p:ph type="sldImg" idx="2"/>
@@ -1561,7 +1599,7 @@
       </p:sp>
       <p:sp>
         <p:nvSpPr>
-          <p:cNvPr id="1961648087" name="Google Shape;162;g339bffbd1fc_0_597:notes"/>
+          <p:cNvPr id="302983624" name="Google Shape;162;g339bffbd1fc_0_597:notes"/>
           <p:cNvSpPr txBox="1"/>
           <p:nvPr>
             <p:ph type="body" idx="1"/>
@@ -1623,7 +1661,7 @@
       </p:grpSpPr>
       <p:sp>
         <p:nvSpPr>
-          <p:cNvPr id="638216515" name="Google Shape;161;g339bffbd1fc_0_597:notes"/>
+          <p:cNvPr id="2098983177" name="Google Shape;161;g339bffbd1fc_0_597:notes"/>
           <p:cNvSpPr/>
           <p:nvPr>
             <p:ph type="sldImg" idx="2"/>
@@ -1662,7 +1700,7 @@
       </p:sp>
       <p:sp>
         <p:nvSpPr>
-          <p:cNvPr id="1994225268" name="Google Shape;162;g339bffbd1fc_0_597:notes"/>
+          <p:cNvPr id="786616585" name="Google Shape;162;g339bffbd1fc_0_597:notes"/>
           <p:cNvSpPr txBox="1"/>
           <p:nvPr>
             <p:ph type="body" idx="1"/>
@@ -1678,7 +1716,7 @@
           </a:prstGeom>
         </p:spPr>
         <p:txBody>
-          <a:bodyPr spcFirstLastPara="1" wrap="square" lIns="91424" tIns="91424" rIns="91424" bIns="91424" anchor="t" anchorCtr="0">
+          <a:bodyPr spcFirstLastPara="1" wrap="square" lIns="91423" tIns="91423" rIns="91423" bIns="91423" anchor="t" anchorCtr="0">
             <a:noAutofit/>
           </a:bodyPr>
           <a:lstStyle/>
@@ -1724,7 +1762,7 @@
       </p:grpSpPr>
       <p:sp>
         <p:nvSpPr>
-          <p:cNvPr id="589822081" name="Google Shape;130;g339bffbd1fc_5_4:notes"/>
+          <p:cNvPr id="1360161480" name="Google Shape;130;g339bffbd1fc_5_4:notes"/>
           <p:cNvSpPr/>
           <p:nvPr>
             <p:ph type="sldImg" idx="2"/>
@@ -1763,7 +1801,7 @@
       </p:sp>
       <p:sp>
         <p:nvSpPr>
-          <p:cNvPr id="1339733835" name="Google Shape;131;g339bffbd1fc_5_4:notes"/>
+          <p:cNvPr id="526840821" name="Google Shape;131;g339bffbd1fc_5_4:notes"/>
           <p:cNvSpPr txBox="1"/>
           <p:nvPr>
             <p:ph type="body" idx="1"/>
@@ -1825,7 +1863,7 @@
       </p:grpSpPr>
       <p:sp>
         <p:nvSpPr>
-          <p:cNvPr id="485116514" name="Google Shape;103;g339bffbd1fc_0_503:notes"/>
+          <p:cNvPr id="384367468" name="Google Shape;103;g339bffbd1fc_0_503:notes"/>
           <p:cNvSpPr/>
           <p:nvPr>
             <p:ph type="sldImg" idx="2"/>
@@ -1864,7 +1902,7 @@
       </p:sp>
       <p:sp>
         <p:nvSpPr>
-          <p:cNvPr id="262359956" name="Google Shape;104;g339bffbd1fc_0_503:notes"/>
+          <p:cNvPr id="1583022745" name="Google Shape;104;g339bffbd1fc_0_503:notes"/>
           <p:cNvSpPr txBox="1"/>
           <p:nvPr>
             <p:ph type="body" idx="1"/>
@@ -1926,7 +1964,7 @@
       </p:grpSpPr>
       <p:sp>
         <p:nvSpPr>
-          <p:cNvPr id="682842434" name="Google Shape;138;g339bffbd1fc_0_374:notes"/>
+          <p:cNvPr id="1036811600" name="Google Shape;138;g339bffbd1fc_0_374:notes"/>
           <p:cNvSpPr/>
           <p:nvPr>
             <p:ph type="sldImg" idx="2"/>
@@ -1965,7 +2003,7 @@
       </p:sp>
       <p:sp>
         <p:nvSpPr>
-          <p:cNvPr id="1865598727" name="Google Shape;139;g339bffbd1fc_0_374:notes"/>
+          <p:cNvPr id="1087111370" name="Google Shape;139;g339bffbd1fc_0_374:notes"/>
           <p:cNvSpPr txBox="1"/>
           <p:nvPr>
             <p:ph type="body" idx="1"/>
@@ -1981,7 +2019,7 @@
           </a:prstGeom>
         </p:spPr>
         <p:txBody>
-          <a:bodyPr spcFirstLastPara="1" wrap="square" lIns="91424" tIns="91424" rIns="91424" bIns="91424" anchor="t" anchorCtr="0">
+          <a:bodyPr spcFirstLastPara="1" wrap="square" lIns="91423" tIns="91423" rIns="91423" bIns="91423" anchor="t" anchorCtr="0">
             <a:noAutofit/>
           </a:bodyPr>
           <a:lstStyle/>
@@ -2027,7 +2065,7 @@
       </p:grpSpPr>
       <p:sp>
         <p:nvSpPr>
-          <p:cNvPr id="441263848" name="Google Shape;103;g339bffbd1fc_0_503:notes"/>
+          <p:cNvPr id="585195530" name="Google Shape;103;g339bffbd1fc_0_503:notes"/>
           <p:cNvSpPr/>
           <p:nvPr>
             <p:ph type="sldImg" idx="2"/>
@@ -2066,7 +2104,7 @@
       </p:sp>
       <p:sp>
         <p:nvSpPr>
-          <p:cNvPr id="1307321375" name="Google Shape;104;g339bffbd1fc_0_503:notes"/>
+          <p:cNvPr id="2060503476" name="Google Shape;104;g339bffbd1fc_0_503:notes"/>
           <p:cNvSpPr txBox="1"/>
           <p:nvPr>
             <p:ph type="body" idx="1"/>
@@ -2082,7 +2120,7 @@
           </a:prstGeom>
         </p:spPr>
         <p:txBody>
-          <a:bodyPr spcFirstLastPara="1" wrap="square" lIns="91424" tIns="91424" rIns="91424" bIns="91424" anchor="t" anchorCtr="0">
+          <a:bodyPr spcFirstLastPara="1" wrap="square" lIns="91423" tIns="91423" rIns="91423" bIns="91423" anchor="t" anchorCtr="0">
             <a:noAutofit/>
           </a:bodyPr>
           <a:lstStyle/>
@@ -2128,7 +2166,7 @@
       </p:grpSpPr>
       <p:sp>
         <p:nvSpPr>
-          <p:cNvPr id="1571438572" name="Google Shape;130;g339bffbd1fc_5_4:notes"/>
+          <p:cNvPr id="2024903368" name="Google Shape;130;g339bffbd1fc_5_4:notes"/>
           <p:cNvSpPr/>
           <p:nvPr>
             <p:ph type="sldImg" idx="2"/>
@@ -2167,7 +2205,7 @@
       </p:sp>
       <p:sp>
         <p:nvSpPr>
-          <p:cNvPr id="1516558209" name="Google Shape;131;g339bffbd1fc_5_4:notes"/>
+          <p:cNvPr id="1204098991" name="Google Shape;131;g339bffbd1fc_5_4:notes"/>
           <p:cNvSpPr txBox="1"/>
           <p:nvPr>
             <p:ph type="body" idx="1"/>
@@ -2183,7 +2221,7 @@
           </a:prstGeom>
         </p:spPr>
         <p:txBody>
-          <a:bodyPr spcFirstLastPara="1" wrap="square" lIns="91424" tIns="91424" rIns="91424" bIns="91424" anchor="t" anchorCtr="0">
+          <a:bodyPr spcFirstLastPara="1" wrap="square" lIns="91423" tIns="91423" rIns="91423" bIns="91423" anchor="t" anchorCtr="0">
             <a:noAutofit/>
           </a:bodyPr>
           <a:lstStyle/>
@@ -2229,7 +2267,7 @@
       </p:grpSpPr>
       <p:sp>
         <p:nvSpPr>
-          <p:cNvPr id="670665224" name="Google Shape;103;g339bffbd1fc_0_503:notes"/>
+          <p:cNvPr id="68508537" name="Google Shape;103;g339bffbd1fc_0_503:notes"/>
           <p:cNvSpPr/>
           <p:nvPr>
             <p:ph type="sldImg" idx="2"/>
@@ -2268,7 +2306,7 @@
       </p:sp>
       <p:sp>
         <p:nvSpPr>
-          <p:cNvPr id="1245521358" name="Google Shape;104;g339bffbd1fc_0_503:notes"/>
+          <p:cNvPr id="261524326" name="Google Shape;104;g339bffbd1fc_0_503:notes"/>
           <p:cNvSpPr txBox="1"/>
           <p:nvPr>
             <p:ph type="body" idx="1"/>
@@ -2284,7 +2322,7 @@
           </a:prstGeom>
         </p:spPr>
         <p:txBody>
-          <a:bodyPr spcFirstLastPara="1" wrap="square" lIns="91424" tIns="91424" rIns="91424" bIns="91424" anchor="t" anchorCtr="0">
+          <a:bodyPr spcFirstLastPara="1" wrap="square" lIns="91423" tIns="91423" rIns="91423" bIns="91423" anchor="t" anchorCtr="0">
             <a:noAutofit/>
           </a:bodyPr>
           <a:lstStyle/>
@@ -2330,7 +2368,7 @@
       </p:grpSpPr>
       <p:pic>
         <p:nvPicPr>
-          <p:cNvPr id="1112830716" name="Google Shape;9;p2" title="shadow-background-natural-palm-leaves.jpg"/>
+          <p:cNvPr id="813115726" name="Google Shape;9;p2" title="shadow-background-natural-palm-leaves.jpg"/>
           <p:cNvPicPr/>
           <p:nvPr/>
         </p:nvPicPr>
@@ -2357,7 +2395,7 @@
       </p:pic>
       <p:sp>
         <p:nvSpPr>
-          <p:cNvPr id="1803643901" name="Google Shape;10;p2"/>
+          <p:cNvPr id="2078255349" name="Google Shape;10;p2"/>
           <p:cNvSpPr/>
           <p:nvPr/>
         </p:nvSpPr>
@@ -2402,7 +2440,7 @@
       </p:sp>
       <p:sp>
         <p:nvSpPr>
-          <p:cNvPr id="1215873397" name="Google Shape;11;p2"/>
+          <p:cNvPr id="1002104206" name="Google Shape;11;p2"/>
           <p:cNvSpPr txBox="1"/>
           <p:nvPr>
             <p:ph type="ctrTitle"/>
@@ -2591,7 +2629,7 @@
       </p:sp>
       <p:sp>
         <p:nvSpPr>
-          <p:cNvPr id="1421155327" name="Google Shape;12;p2"/>
+          <p:cNvPr id="1440635523" name="Google Shape;12;p2"/>
           <p:cNvSpPr txBox="1"/>
           <p:nvPr>
             <p:ph type="subTitle" idx="1"/>
@@ -2777,7 +2815,7 @@
       </p:grpSpPr>
       <p:pic>
         <p:nvPicPr>
-          <p:cNvPr id="1965091313" name="Google Shape;14;p3" title="abstract-grainy-texture-background (2).jpg"/>
+          <p:cNvPr id="867453636" name="Google Shape;14;p3" title="abstract-grainy-texture-background (2).jpg"/>
           <p:cNvPicPr/>
           <p:nvPr/>
         </p:nvPicPr>
@@ -2804,7 +2842,7 @@
       </p:pic>
       <p:sp>
         <p:nvSpPr>
-          <p:cNvPr id="636006093" name="Google Shape;15;p3"/>
+          <p:cNvPr id="1273887035" name="Google Shape;15;p3"/>
           <p:cNvSpPr/>
           <p:nvPr/>
         </p:nvSpPr>
@@ -2849,7 +2887,7 @@
       </p:sp>
       <p:sp>
         <p:nvSpPr>
-          <p:cNvPr id="1599491907" name="Google Shape;16;p3"/>
+          <p:cNvPr id="710110692" name="Google Shape;16;p3"/>
           <p:cNvSpPr txBox="1"/>
           <p:nvPr>
             <p:ph type="title"/>
@@ -2979,7 +3017,7 @@
       </p:sp>
       <p:sp>
         <p:nvSpPr>
-          <p:cNvPr id="1585398021" name="Google Shape;17;p3"/>
+          <p:cNvPr id="1840074872" name="Google Shape;17;p3"/>
           <p:cNvSpPr txBox="1"/>
           <p:nvPr>
             <p:ph type="subTitle" idx="1"/>
@@ -3109,7 +3147,7 @@
       </p:sp>
       <p:sp>
         <p:nvSpPr>
-          <p:cNvPr id="1762802173" name="Google Shape;18;p3"/>
+          <p:cNvPr id="1273110612" name="Google Shape;18;p3"/>
           <p:cNvSpPr txBox="1"/>
           <p:nvPr>
             <p:ph type="title" idx="2" hasCustomPrompt="1"/>
@@ -3268,7 +3306,7 @@
       </p:grpSpPr>
       <p:sp>
         <p:nvSpPr>
-          <p:cNvPr id="854152197" name="Google Shape;20;p4"/>
+          <p:cNvPr id="2071673607" name="Google Shape;20;p4"/>
           <p:cNvSpPr txBox="1"/>
           <p:nvPr>
             <p:ph type="title"/>
@@ -3398,7 +3436,7 @@
       </p:sp>
       <p:sp>
         <p:nvSpPr>
-          <p:cNvPr id="299505191" name="Google Shape;21;p4"/>
+          <p:cNvPr id="1336743019" name="Google Shape;21;p4"/>
           <p:cNvSpPr txBox="1"/>
           <p:nvPr>
             <p:ph type="body" idx="1"/>
@@ -3561,7 +3599,7 @@
       </p:sp>
       <p:pic>
         <p:nvPicPr>
-          <p:cNvPr id="767574295" name="Google Shape;22;p4" title="shadow-background-natural-palm-leaves.jpg"/>
+          <p:cNvPr id="570818857" name="Google Shape;22;p4" title="shadow-background-natural-palm-leaves.jpg"/>
           <p:cNvPicPr/>
           <p:nvPr/>
         </p:nvPicPr>
@@ -3588,7 +3626,7 @@
       </p:pic>
       <p:cxnSp>
         <p:nvCxnSpPr>
-          <p:cNvPr id="1825185599" name="Google Shape;23;p4"/>
+          <p:cNvPr id="874142910" name="Google Shape;23;p4"/>
           <p:cNvCxnSpPr/>
           <p:nvPr/>
         </p:nvCxnSpPr>
@@ -3639,7 +3677,7 @@
       </p:grpSpPr>
       <p:sp>
         <p:nvSpPr>
-          <p:cNvPr id="286473876" name="Google Shape;25;p5"/>
+          <p:cNvPr id="693882150" name="Google Shape;25;p5"/>
           <p:cNvSpPr txBox="1"/>
           <p:nvPr>
             <p:ph type="subTitle" idx="1"/>
@@ -3841,7 +3879,7 @@
       </p:sp>
       <p:sp>
         <p:nvSpPr>
-          <p:cNvPr id="405403244" name="Google Shape;26;p5"/>
+          <p:cNvPr id="749476089" name="Google Shape;26;p5"/>
           <p:cNvSpPr txBox="1"/>
           <p:nvPr>
             <p:ph type="subTitle" idx="2"/>
@@ -4043,7 +4081,7 @@
       </p:sp>
       <p:cxnSp>
         <p:nvCxnSpPr>
-          <p:cNvPr id="789864695" name="Google Shape;27;p5"/>
+          <p:cNvPr id="708863738" name="Google Shape;27;p5"/>
           <p:cNvCxnSpPr/>
           <p:nvPr/>
         </p:nvCxnSpPr>
@@ -4094,7 +4132,7 @@
       </p:grpSpPr>
       <p:sp>
         <p:nvSpPr>
-          <p:cNvPr id="1366140182" name="Google Shape;32;p7"/>
+          <p:cNvPr id="595980456" name="Google Shape;32;p7"/>
           <p:cNvSpPr txBox="1"/>
           <p:nvPr>
             <p:ph type="title"/>
@@ -4224,7 +4262,7 @@
       </p:sp>
       <p:sp>
         <p:nvSpPr>
-          <p:cNvPr id="1896023361" name="Google Shape;33;p7"/>
+          <p:cNvPr id="2052636411" name="Google Shape;33;p7"/>
           <p:cNvSpPr/>
           <p:nvPr>
             <p:ph type="pic" idx="2"/>
@@ -4246,7 +4284,7 @@
       </p:sp>
       <p:sp>
         <p:nvSpPr>
-          <p:cNvPr id="1569764112" name="Google Shape;34;p7"/>
+          <p:cNvPr id="281151401" name="Google Shape;34;p7"/>
           <p:cNvSpPr txBox="1"/>
           <p:nvPr>
             <p:ph type="subTitle" idx="1"/>
@@ -4401,7 +4439,7 @@
       </p:grpSpPr>
       <p:sp>
         <p:nvSpPr>
-          <p:cNvPr id="1862219833" name="Google Shape;36;p8"/>
+          <p:cNvPr id="1827339606" name="Google Shape;36;p8"/>
           <p:cNvSpPr txBox="1"/>
           <p:nvPr>
             <p:ph type="title"/>
@@ -4531,7 +4569,7 @@
       </p:sp>
       <p:cxnSp>
         <p:nvCxnSpPr>
-          <p:cNvPr id="738566592" name="Google Shape;37;p8"/>
+          <p:cNvPr id="1016730254" name="Google Shape;37;p8"/>
           <p:cNvCxnSpPr/>
           <p:nvPr/>
         </p:nvCxnSpPr>
@@ -4557,7 +4595,7 @@
       </p:cxnSp>
       <p:cxnSp>
         <p:nvCxnSpPr>
-          <p:cNvPr id="465431562" name="Google Shape;38;p8"/>
+          <p:cNvPr id="551150993" name="Google Shape;38;p8"/>
           <p:cNvCxnSpPr/>
           <p:nvPr/>
         </p:nvCxnSpPr>
@@ -4608,7 +4646,7 @@
       </p:grpSpPr>
       <p:sp>
         <p:nvSpPr>
-          <p:cNvPr id="1250151656" name="Google Shape;47;p11"/>
+          <p:cNvPr id="126769461" name="Google Shape;47;p11"/>
           <p:cNvSpPr txBox="1"/>
           <p:nvPr>
             <p:ph type="title" hasCustomPrompt="1"/>
@@ -4742,7 +4780,7 @@
       </p:sp>
       <p:sp>
         <p:nvSpPr>
-          <p:cNvPr id="1501471057" name="Google Shape;48;p11"/>
+          <p:cNvPr id="1900099532" name="Google Shape;48;p11"/>
           <p:cNvSpPr txBox="1"/>
           <p:nvPr>
             <p:ph type="subTitle" idx="1"/>
@@ -4899,7 +4937,7 @@
       </p:sp>
       <p:cxnSp>
         <p:nvCxnSpPr>
-          <p:cNvPr id="668048748" name="Google Shape;49;p11"/>
+          <p:cNvPr id="1832081003" name="Google Shape;49;p11"/>
           <p:cNvCxnSpPr/>
           <p:nvPr/>
         </p:nvCxnSpPr>
@@ -4925,7 +4963,7 @@
       </p:cxnSp>
       <p:cxnSp>
         <p:nvCxnSpPr>
-          <p:cNvPr id="682166990" name="Google Shape;50;p11"/>
+          <p:cNvPr id="1421295402" name="Google Shape;50;p11"/>
           <p:cNvCxnSpPr/>
           <p:nvPr/>
         </p:nvCxnSpPr>
@@ -5001,7 +5039,7 @@
       </p:grpSpPr>
       <p:pic>
         <p:nvPicPr>
-          <p:cNvPr id="2021847315" name="Google Shape;53;p13" title="silhouette-person-city (2).jpg"/>
+          <p:cNvPr id="595578456" name="Google Shape;53;p13" title="silhouette-person-city (2).jpg"/>
           <p:cNvPicPr/>
           <p:nvPr/>
         </p:nvPicPr>
@@ -5030,7 +5068,7 @@
       </p:pic>
       <p:sp>
         <p:nvSpPr>
-          <p:cNvPr id="2108635247" name="Google Shape;54;p13"/>
+          <p:cNvPr id="229058362" name="Google Shape;54;p13"/>
           <p:cNvSpPr/>
           <p:nvPr/>
         </p:nvSpPr>
@@ -5075,7 +5113,7 @@
       </p:sp>
       <p:sp>
         <p:nvSpPr>
-          <p:cNvPr id="1232390172" name="Google Shape;55;p13"/>
+          <p:cNvPr id="1382507118" name="Google Shape;55;p13"/>
           <p:cNvSpPr txBox="1"/>
           <p:nvPr>
             <p:ph type="title"/>
@@ -5205,7 +5243,7 @@
       </p:sp>
       <p:sp>
         <p:nvSpPr>
-          <p:cNvPr id="89366042" name="Google Shape;56;p13"/>
+          <p:cNvPr id="2050090483" name="Google Shape;56;p13"/>
           <p:cNvSpPr txBox="1"/>
           <p:nvPr>
             <p:ph type="subTitle" idx="1"/>
@@ -5391,7 +5429,7 @@
       </p:grpSpPr>
       <p:sp>
         <p:nvSpPr>
-          <p:cNvPr id="477705272" name="Google Shape;6;p1"/>
+          <p:cNvPr id="1341249472" name="Google Shape;6;p1"/>
           <p:cNvSpPr txBox="1"/>
           <p:nvPr>
             <p:ph type="title"/>
@@ -5624,7 +5662,7 @@
       </p:sp>
       <p:sp>
         <p:nvSpPr>
-          <p:cNvPr id="1365384602" name="Google Shape;7;p1"/>
+          <p:cNvPr id="1161335348" name="Google Shape;7;p1"/>
           <p:cNvSpPr txBox="1"/>
           <p:nvPr>
             <p:ph type="body" idx="1"/>
@@ -6581,7 +6619,7 @@
       </p:grpSpPr>
       <p:sp>
         <p:nvSpPr>
-          <p:cNvPr id="1971007293" name="Google Shape;98;p24"/>
+          <p:cNvPr id="206100480" name="Google Shape;98;p24"/>
           <p:cNvSpPr txBox="1"/>
           <p:nvPr>
             <p:ph type="ctrTitle"/>
@@ -6597,7 +6635,7 @@
           </a:prstGeom>
         </p:spPr>
         <p:txBody>
-          <a:bodyPr spcFirstLastPara="1" wrap="square" lIns="91424" tIns="91424" rIns="91424" bIns="91424" anchor="t" anchorCtr="0">
+          <a:bodyPr spcFirstLastPara="1" wrap="square" lIns="91423" tIns="91423" rIns="91423" bIns="91423" anchor="t" anchorCtr="0">
             <a:noAutofit/>
           </a:bodyPr>
           <a:lstStyle/>
@@ -6673,7 +6711,7 @@
       </p:sp>
       <p:sp>
         <p:nvSpPr>
-          <p:cNvPr id="364062745" name="Google Shape;99;p24"/>
+          <p:cNvPr id="269567581" name="Google Shape;99;p24"/>
           <p:cNvSpPr txBox="1"/>
           <p:nvPr>
             <p:ph type="subTitle" idx="1"/>
@@ -6689,7 +6727,7 @@
           </a:prstGeom>
         </p:spPr>
         <p:txBody>
-          <a:bodyPr spcFirstLastPara="1" wrap="square" lIns="91424" tIns="91424" rIns="91424" bIns="91424" anchor="t" anchorCtr="0">
+          <a:bodyPr spcFirstLastPara="1" wrap="square" lIns="91423" tIns="91423" rIns="91423" bIns="91423" anchor="t" anchorCtr="0">
             <a:noAutofit/>
           </a:bodyPr>
           <a:lstStyle/>
@@ -6713,7 +6751,7 @@
       </p:sp>
       <p:cxnSp>
         <p:nvCxnSpPr>
-          <p:cNvPr id="481561359" name="Google Shape;100;p24"/>
+          <p:cNvPr id="384658815" name="Google Shape;100;p24"/>
           <p:cNvCxnSpPr/>
           <p:nvPr/>
         </p:nvCxnSpPr>
@@ -6739,7 +6777,7 @@
       </p:cxnSp>
       <p:sp>
         <p:nvSpPr>
-          <p:cNvPr id="738660555" name="Google Shape;101;p24"/>
+          <p:cNvPr id="430363255" name="Google Shape;101;p24"/>
           <p:cNvSpPr txBox="1"/>
           <p:nvPr/>
         </p:nvSpPr>
@@ -6840,7 +6878,7 @@
       </p:grpSpPr>
       <p:sp>
         <p:nvSpPr>
-          <p:cNvPr id="361581084" name="Google Shape;133;p28"/>
+          <p:cNvPr id="353142925" name="Google Shape;133;p28"/>
           <p:cNvSpPr txBox="1"/>
           <p:nvPr>
             <p:ph type="title"/>
@@ -6856,7 +6894,7 @@
           </a:prstGeom>
         </p:spPr>
         <p:txBody>
-          <a:bodyPr spcFirstLastPara="1" vertOverflow="overflow" horzOverflow="overflow" vert="horz" wrap="square" lIns="91424" tIns="91424" rIns="91424" bIns="91424" numCol="1" spcCol="0" rtlCol="0" fromWordArt="0" anchor="ctr" anchorCtr="0" forceAA="0" upright="0" compatLnSpc="0">
+          <a:bodyPr spcFirstLastPara="1" vertOverflow="overflow" horzOverflow="overflow" vert="horz" wrap="square" lIns="91423" tIns="91423" rIns="91423" bIns="91423" numCol="1" spcCol="0" rtlCol="0" fromWordArt="0" anchor="ctr" anchorCtr="0" forceAA="0" upright="0" compatLnSpc="0">
             <a:noAutofit/>
           </a:bodyPr>
           <a:lstStyle/>
@@ -6899,7 +6937,7 @@
       </p:sp>
       <p:sp>
         <p:nvSpPr>
-          <p:cNvPr id="1064986134" name="Google Shape;134;p28"/>
+          <p:cNvPr id="1990655189" name="Google Shape;134;p28"/>
           <p:cNvSpPr txBox="1"/>
           <p:nvPr>
             <p:ph type="title" idx="2"/>
@@ -6915,7 +6953,7 @@
           </a:prstGeom>
         </p:spPr>
         <p:txBody>
-          <a:bodyPr spcFirstLastPara="1" wrap="square" lIns="91424" tIns="91424" rIns="91424" bIns="91424" anchor="ctr" anchorCtr="0">
+          <a:bodyPr spcFirstLastPara="1" wrap="square" lIns="91423" tIns="91423" rIns="91423" bIns="91423" anchor="ctr" anchorCtr="0">
             <a:noAutofit/>
           </a:bodyPr>
           <a:lstStyle/>
@@ -6944,7 +6982,7 @@
       </p:sp>
       <p:sp>
         <p:nvSpPr>
-          <p:cNvPr id="1287979188" name="Google Shape;135;p28"/>
+          <p:cNvPr id="292391322" name="Google Shape;135;p28"/>
           <p:cNvSpPr txBox="1"/>
           <p:nvPr>
             <p:ph type="subTitle" idx="1"/>
@@ -6960,7 +6998,7 @@
           </a:prstGeom>
         </p:spPr>
         <p:txBody>
-          <a:bodyPr spcFirstLastPara="1" vertOverflow="overflow" horzOverflow="overflow" vert="horz" wrap="square" lIns="91424" tIns="91424" rIns="91424" bIns="91424" numCol="1" spcCol="0" rtlCol="0" fromWordArt="0" anchor="ctr" anchorCtr="0" forceAA="0" upright="0" compatLnSpc="0">
+          <a:bodyPr spcFirstLastPara="1" vertOverflow="overflow" horzOverflow="overflow" vert="horz" wrap="square" lIns="91423" tIns="91423" rIns="91423" bIns="91423" numCol="1" spcCol="0" rtlCol="0" fromWordArt="0" anchor="ctr" anchorCtr="0" forceAA="0" upright="0" compatLnSpc="0">
             <a:noAutofit/>
           </a:bodyPr>
           <a:lstStyle/>
@@ -7006,7 +7044,7 @@
                 <a:ea typeface="DM Sans"/>
                 <a:cs typeface="DM Sans"/>
               </a:rPr>
-              <a:t> (trained models as verbalizers with total of k training)</a:t>
+              <a:t> (trained models as verbalizers with total of k training samples)</a:t>
             </a:r>
             <a:endParaRPr lang="it-IT" sz="1200"/>
           </a:p>
@@ -7142,7 +7180,7 @@
       </p:sp>
       <p:cxnSp>
         <p:nvCxnSpPr>
-          <p:cNvPr id="164941528" name="Google Shape;136;p28"/>
+          <p:cNvPr id="530055681" name="Google Shape;136;p28"/>
           <p:cNvCxnSpPr/>
           <p:nvPr/>
         </p:nvCxnSpPr>
@@ -7168,7 +7206,7 @@
       </p:cxnSp>
       <p:sp>
         <p:nvSpPr>
-          <p:cNvPr id="1779230099" name=""/>
+          <p:cNvPr id="1258933358" name=""/>
           <p:cNvSpPr/>
           <p:nvPr/>
         </p:nvSpPr>
@@ -7351,7 +7389,7 @@
       </p:grpSpPr>
       <p:sp>
         <p:nvSpPr>
-          <p:cNvPr id="1025078240" name="Google Shape;106;p25"/>
+          <p:cNvPr id="115308483" name="Google Shape;106;p25"/>
           <p:cNvSpPr txBox="1"/>
           <p:nvPr>
             <p:ph type="title"/>
@@ -7367,7 +7405,7 @@
           </a:prstGeom>
         </p:spPr>
         <p:txBody>
-          <a:bodyPr spcFirstLastPara="1" wrap="square" lIns="91424" tIns="91424" rIns="91424" bIns="91424" anchor="t" anchorCtr="0">
+          <a:bodyPr spcFirstLastPara="1" wrap="square" lIns="91423" tIns="91423" rIns="91423" bIns="91423" anchor="t" anchorCtr="0">
             <a:noAutofit/>
           </a:bodyPr>
           <a:lstStyle/>
@@ -7396,7 +7434,7 @@
       </p:sp>
       <p:graphicFrame>
         <p:nvGraphicFramePr>
-          <p:cNvPr id="1095185862" name="Google Shape;108;p25"/>
+          <p:cNvPr id="356833282" name="Google Shape;108;p25"/>
           <p:cNvGraphicFramePr>
             <a:graphicFrameLocks xmlns:a="http://schemas.openxmlformats.org/drawingml/2006/main"/>
           </p:cNvGraphicFramePr>
@@ -7447,7 +7485,7 @@
                       </a:endParaRPr>
                     </a:p>
                   </a:txBody>
-                  <a:tcPr marL="91424" marR="91424" marT="0" marB="0" anchor="ctr">
+                  <a:tcPr marL="91423" marR="91423" marT="0" marB="0" anchor="ctr">
                     <a:lnL w="9524" algn="ctr">
                       <a:solidFill>
                         <a:schemeClr val="dk1"/>
@@ -7508,7 +7546,7 @@
                       </a:endParaRPr>
                     </a:p>
                   </a:txBody>
-                  <a:tcPr marL="91424" marR="91424" marT="0" marB="0" anchor="ctr">
+                  <a:tcPr marL="91423" marR="91423" marT="0" marB="0" anchor="ctr">
                     <a:lnL w="9524" algn="ctr">
                       <a:solidFill>
                         <a:schemeClr val="dk1"/>
@@ -7570,7 +7608,7 @@
                       </a:endParaRPr>
                     </a:p>
                   </a:txBody>
-                  <a:tcPr marL="91424" marR="91424" marT="0" marB="0" anchor="ctr">
+                  <a:tcPr marL="91423" marR="91423" marT="0" marB="0" anchor="ctr">
                     <a:lnL w="9524" algn="ctr">
                       <a:solidFill>
                         <a:schemeClr val="dk1"/>
@@ -7632,7 +7670,7 @@
                       </a:endParaRPr>
                     </a:p>
                   </a:txBody>
-                  <a:tcPr marL="91424" marR="91424" marT="0" marB="0" anchor="ctr">
+                  <a:tcPr marL="91423" marR="91423" marT="0" marB="0" anchor="ctr">
                     <a:lnL w="9524" algn="ctr">
                       <a:solidFill>
                         <a:schemeClr val="dk1"/>
@@ -7678,7 +7716,7 @@
                       <a:endParaRPr/>
                     </a:p>
                   </a:txBody>
-                  <a:tcPr marL="91424" marR="91424" marT="0" marB="0" anchor="ctr">
+                  <a:tcPr marL="91423" marR="91423" marT="0" marB="0" anchor="ctr">
                     <a:lnL w="9524" algn="ctr">
                       <a:solidFill>
                         <a:schemeClr val="dk1"/>
@@ -7739,7 +7777,7 @@
                       </a:endParaRPr>
                     </a:p>
                   </a:txBody>
-                  <a:tcPr marL="91424" marR="91424" marT="0" marB="0" anchor="ctr">
+                  <a:tcPr marL="91423" marR="91423" marT="0" marB="0" anchor="ctr">
                     <a:lnL w="9524" algn="ctr">
                       <a:solidFill>
                         <a:schemeClr val="dk1"/>
@@ -7800,7 +7838,7 @@
                       </a:endParaRPr>
                     </a:p>
                   </a:txBody>
-                  <a:tcPr marL="91424" marR="91424" marT="0" marB="0" anchor="ctr">
+                  <a:tcPr marL="91423" marR="91423" marT="0" marB="0" anchor="ctr">
                     <a:lnL w="9524" algn="ctr">
                       <a:solidFill>
                         <a:schemeClr val="dk1"/>
@@ -7861,7 +7899,7 @@
                       </a:endParaRPr>
                     </a:p>
                   </a:txBody>
-                  <a:tcPr marL="91424" marR="91424" marT="0" marB="0" anchor="ctr">
+                  <a:tcPr marL="91423" marR="91423" marT="0" marB="0" anchor="ctr">
                     <a:lnL w="9524" algn="ctr">
                       <a:solidFill>
                         <a:schemeClr val="dk1"/>
@@ -7922,7 +7960,7 @@
                       </a:endParaRPr>
                     </a:p>
                   </a:txBody>
-                  <a:tcPr marL="91424" marR="91424" marT="0" marB="0" anchor="ctr">
+                  <a:tcPr marL="91423" marR="91423" marT="0" marB="0" anchor="ctr">
                     <a:lnL w="9524" algn="ctr">
                       <a:solidFill>
                         <a:schemeClr val="dk1"/>
@@ -7983,7 +8021,7 @@
                       </a:endParaRPr>
                     </a:p>
                   </a:txBody>
-                  <a:tcPr marL="91424" marR="91424" marT="0" marB="0" anchor="ctr">
+                  <a:tcPr marL="91423" marR="91423" marT="0" marB="0" anchor="ctr">
                     <a:lnL w="9524" algn="ctr">
                       <a:solidFill>
                         <a:schemeClr val="dk1"/>
@@ -8044,7 +8082,7 @@
                       </a:endParaRPr>
                     </a:p>
                   </a:txBody>
-                  <a:tcPr marL="91424" marR="91424" marT="0" marB="0" anchor="ctr">
+                  <a:tcPr marL="91423" marR="91423" marT="0" marB="0" anchor="ctr">
                     <a:lnL w="9524" algn="ctr">
                       <a:solidFill>
                         <a:schemeClr val="dk1"/>
@@ -8107,7 +8145,7 @@
                       </a:endParaRPr>
                     </a:p>
                   </a:txBody>
-                  <a:tcPr marL="91424" marR="91424" marT="0" marB="0" anchor="ctr">
+                  <a:tcPr marL="91423" marR="91423" marT="0" marB="0" anchor="ctr">
                     <a:lnL w="9524" algn="ctr">
                       <a:solidFill>
                         <a:schemeClr val="dk1"/>
@@ -8149,7 +8187,7 @@
                       <a:endParaRPr sz="1200" b="0"/>
                     </a:p>
                   </a:txBody>
-                  <a:tcPr marL="91424" marR="91424" marT="0" marB="0" anchor="ctr">
+                  <a:tcPr marL="91423" marR="91423" marT="0" marB="0" anchor="ctr">
                     <a:lnL w="9524" algn="ctr">
                       <a:solidFill>
                         <a:schemeClr val="dk1"/>
@@ -8191,7 +8229,7 @@
                       <a:endParaRPr sz="1200" b="0"/>
                     </a:p>
                   </a:txBody>
-                  <a:tcPr marL="91424" marR="91424" marT="0" marB="0" anchor="ctr">
+                  <a:tcPr marL="91423" marR="91423" marT="0" marB="0" anchor="ctr">
                     <a:lnL w="9524" algn="ctr">
                       <a:solidFill>
                         <a:schemeClr val="dk1"/>
@@ -8233,7 +8271,7 @@
                       <a:endParaRPr lang="it-IT" sz="1200" b="0"/>
                     </a:p>
                   </a:txBody>
-                  <a:tcPr marL="91424" marR="91424" marT="0" marB="0" anchor="ctr">
+                  <a:tcPr marL="91423" marR="91423" marT="0" marB="0" anchor="ctr">
                     <a:lnL w="9524" algn="ctr">
                       <a:solidFill>
                         <a:schemeClr val="dk1"/>
@@ -8275,7 +8313,7 @@
                       <a:endParaRPr lang="it-IT" sz="1200" b="0"/>
                     </a:p>
                   </a:txBody>
-                  <a:tcPr marL="91424" marR="91424" marT="0" marB="0" anchor="ctr">
+                  <a:tcPr marL="91423" marR="91423" marT="0" marB="0" anchor="ctr">
                     <a:lnL w="9524" algn="ctr">
                       <a:solidFill>
                         <a:schemeClr val="dk1"/>
@@ -8317,7 +8355,7 @@
                       <a:endParaRPr lang="it-IT" sz="1200" b="0"/>
                     </a:p>
                   </a:txBody>
-                  <a:tcPr marL="91424" marR="91424" marT="0" marB="0" anchor="ctr">
+                  <a:tcPr marL="91423" marR="91423" marT="0" marB="0" anchor="ctr">
                     <a:lnL w="9524" algn="ctr">
                       <a:solidFill>
                         <a:schemeClr val="dk1"/>
@@ -8359,7 +8397,7 @@
                       <a:endParaRPr lang="it-IT" sz="1200" b="0"/>
                     </a:p>
                   </a:txBody>
-                  <a:tcPr marL="91424" marR="91424" marT="0" marB="0" anchor="ctr">
+                  <a:tcPr marL="91423" marR="91423" marT="0" marB="0" anchor="ctr">
                     <a:lnL w="9524" algn="ctr">
                       <a:solidFill>
                         <a:schemeClr val="dk1"/>
@@ -8424,7 +8462,7 @@
                       </a:endParaRPr>
                     </a:p>
                   </a:txBody>
-                  <a:tcPr marL="91424" marR="91424" marT="0" marB="0" anchor="ctr">
+                  <a:tcPr marL="91423" marR="91423" marT="0" marB="0" anchor="ctr">
                     <a:lnL w="9524" algn="ctr">
                       <a:solidFill>
                         <a:schemeClr val="dk1"/>
@@ -8466,7 +8504,7 @@
                       <a:endParaRPr sz="1200" b="0"/>
                     </a:p>
                   </a:txBody>
-                  <a:tcPr marL="91424" marR="91424" marT="0" marB="0" anchor="ctr">
+                  <a:tcPr marL="91423" marR="91423" marT="0" marB="0" anchor="ctr">
                     <a:lnL w="9524" algn="ctr">
                       <a:solidFill>
                         <a:schemeClr val="dk1"/>
@@ -8536,7 +8574,7 @@
                       <a:endParaRPr sz="1200" b="0"/>
                     </a:p>
                   </a:txBody>
-                  <a:tcPr marL="91424" marR="91424" marT="0" marB="0" anchor="ctr">
+                  <a:tcPr marL="91423" marR="91423" marT="0" marB="0" anchor="ctr">
                     <a:lnL w="9524" algn="ctr">
                       <a:solidFill>
                         <a:schemeClr val="dk1"/>
@@ -8592,7 +8630,7 @@
                       </a:endParaRPr>
                     </a:p>
                   </a:txBody>
-                  <a:tcPr marL="91424" marR="91424" marT="0" marB="0" anchor="ctr">
+                  <a:tcPr marL="91423" marR="91423" marT="0" marB="0" anchor="ctr">
                     <a:lnL w="9524" algn="ctr">
                       <a:solidFill>
                         <a:schemeClr val="dk1"/>
@@ -8669,7 +8707,7 @@
                       </a:endParaRPr>
                     </a:p>
                   </a:txBody>
-                  <a:tcPr marL="91424" marR="91424" marT="0" marB="0" anchor="ctr">
+                  <a:tcPr marL="91423" marR="91423" marT="0" marB="0" anchor="ctr">
                     <a:lnL w="9524" algn="ctr">
                       <a:solidFill>
                         <a:schemeClr val="dk1"/>
@@ -8725,7 +8763,7 @@
                       </a:endParaRPr>
                     </a:p>
                   </a:txBody>
-                  <a:tcPr marL="91424" marR="91424" marT="0" marB="0" anchor="ctr">
+                  <a:tcPr marL="91423" marR="91423" marT="0" marB="0" anchor="ctr">
                     <a:lnL w="9524" algn="ctr">
                       <a:solidFill>
                         <a:schemeClr val="dk1"/>
@@ -8802,7 +8840,7 @@
                       </a:endParaRPr>
                     </a:p>
                   </a:txBody>
-                  <a:tcPr marL="91424" marR="91424" marT="0" marB="0" anchor="ctr">
+                  <a:tcPr marL="91423" marR="91423" marT="0" marB="0" anchor="ctr">
                     <a:lnL w="9524" algn="ctr">
                       <a:solidFill>
                         <a:schemeClr val="dk1"/>
@@ -8867,7 +8905,7 @@
                       </a:endParaRPr>
                     </a:p>
                   </a:txBody>
-                  <a:tcPr marL="91424" marR="91424" marT="0" marB="0" anchor="ctr">
+                  <a:tcPr marL="91423" marR="91423" marT="0" marB="0" anchor="ctr">
                     <a:lnL w="9524" algn="ctr">
                       <a:solidFill>
                         <a:schemeClr val="dk1"/>
@@ -8941,7 +8979,7 @@
                       </a:endParaRPr>
                     </a:p>
                   </a:txBody>
-                  <a:tcPr marL="91424" marR="91424" marT="0" marB="0" anchor="ctr">
+                  <a:tcPr marL="91423" marR="91423" marT="0" marB="0" anchor="ctr">
                     <a:lnL w="9524" algn="ctr">
                       <a:solidFill>
                         <a:schemeClr val="dk1"/>
@@ -9015,7 +9053,7 @@
                       </a:endParaRPr>
                     </a:p>
                   </a:txBody>
-                  <a:tcPr marL="91424" marR="91424" marT="0" marB="0" anchor="ctr">
+                  <a:tcPr marL="91423" marR="91423" marT="0" marB="0" anchor="ctr">
                     <a:lnL w="9524" algn="ctr">
                       <a:solidFill>
                         <a:schemeClr val="dk1"/>
@@ -9071,7 +9109,7 @@
                       </a:endParaRPr>
                     </a:p>
                   </a:txBody>
-                  <a:tcPr marL="91424" marR="91424" marT="0" marB="0" anchor="ctr">
+                  <a:tcPr marL="91423" marR="91423" marT="0" marB="0" anchor="ctr">
                     <a:lnL w="9524" algn="ctr">
                       <a:solidFill>
                         <a:schemeClr val="dk1"/>
@@ -9148,7 +9186,7 @@
                       </a:endParaRPr>
                     </a:p>
                   </a:txBody>
-                  <a:tcPr marL="91424" marR="91424" marT="0" marB="0" anchor="ctr">
+                  <a:tcPr marL="91423" marR="91423" marT="0" marB="0" anchor="ctr">
                     <a:lnL w="9524" algn="ctr">
                       <a:solidFill>
                         <a:schemeClr val="dk1"/>
@@ -9204,7 +9242,7 @@
                       </a:endParaRPr>
                     </a:p>
                   </a:txBody>
-                  <a:tcPr marL="91424" marR="91424" marT="0" marB="0" anchor="ctr">
+                  <a:tcPr marL="91423" marR="91423" marT="0" marB="0" anchor="ctr">
                     <a:lnL w="9524" algn="ctr">
                       <a:solidFill>
                         <a:schemeClr val="dk1"/>
@@ -9281,7 +9319,7 @@
                       </a:endParaRPr>
                     </a:p>
                   </a:txBody>
-                  <a:tcPr marL="91424" marR="91424" marT="0" marB="0" anchor="ctr">
+                  <a:tcPr marL="91423" marR="91423" marT="0" marB="0" anchor="ctr">
                     <a:lnL w="9524" algn="ctr">
                       <a:solidFill>
                         <a:schemeClr val="dk1"/>
@@ -9316,7 +9354,7 @@
       </p:graphicFrame>
       <p:sp>
         <p:nvSpPr>
-          <p:cNvPr id="1009750404" name="Google Shape;107;p25"/>
+          <p:cNvPr id="9321597" name="Google Shape;107;p25"/>
           <p:cNvSpPr txBox="1"/>
           <p:nvPr>
             <p:ph type="body" idx="1"/>
@@ -9332,7 +9370,7 @@
           </a:prstGeom>
         </p:spPr>
         <p:txBody>
-          <a:bodyPr spcFirstLastPara="1" wrap="square" lIns="91424" tIns="91424" rIns="91424" bIns="91424" anchor="t" anchorCtr="0">
+          <a:bodyPr spcFirstLastPara="1" wrap="square" lIns="91423" tIns="91423" rIns="91423" bIns="91423" anchor="t" anchorCtr="0">
             <a:noAutofit/>
           </a:bodyPr>
           <a:lstStyle/>
@@ -9475,7 +9513,7 @@
                 <a:ea typeface="DM Sans"/>
                 <a:cs typeface="DM Sans"/>
               </a:rPr>
-              <a:t>. If we evaluate difference between this prompt and LMAOSI’s prompt we can n</a:t>
+              <a:t>. If we evaluate difference between this prompt (</a:t>
             </a:r>
             <a:r>
               <a:rPr lang="it-IT" sz="1200" b="1" i="0" u="none" strike="noStrike" cap="none" spc="0">
@@ -9486,7 +9524,51 @@
                 <a:ea typeface="DM Sans"/>
                 <a:cs typeface="DM Sans"/>
               </a:rPr>
-              <a:t>arrow the difference between results from original paper and our results</a:t>
+              <a:t>especially with BERT</a:t>
+            </a:r>
+            <a:r>
+              <a:rPr lang="it-IT" sz="1200" b="0" i="0" u="none" strike="noStrike" cap="none" spc="0">
+                <a:solidFill>
+                  <a:schemeClr val="dk1"/>
+                </a:solidFill>
+                <a:latin typeface="DM Sans"/>
+                <a:ea typeface="DM Sans"/>
+                <a:cs typeface="DM Sans"/>
+              </a:rPr>
+              <a:t>) and LMAOSI’s prompt we can </a:t>
+            </a:r>
+            <a:r>
+              <a:rPr lang="it-IT" sz="1200" b="1" i="0" u="none" strike="noStrike" cap="none" spc="0">
+                <a:solidFill>
+                  <a:schemeClr val="dk1"/>
+                </a:solidFill>
+                <a:latin typeface="DM Sans"/>
+                <a:ea typeface="DM Sans"/>
+                <a:cs typeface="DM Sans"/>
+              </a:rPr>
+              <a:t>n</a:t>
+            </a:r>
+            <a:r>
+              <a:rPr lang="it-IT" sz="1200" b="1" i="0" u="none" strike="noStrike" cap="none" spc="0">
+                <a:solidFill>
+                  <a:schemeClr val="dk1"/>
+                </a:solidFill>
+                <a:latin typeface="DM Sans"/>
+                <a:ea typeface="DM Sans"/>
+                <a:cs typeface="DM Sans"/>
+              </a:rPr>
+              <a:t>arrow </a:t>
+            </a:r>
+            <a:r>
+              <a:rPr lang="it-IT" sz="1200" b="1" i="0" u="none" strike="noStrike" cap="none" spc="0">
+                <a:solidFill>
+                  <a:schemeClr val="dk1"/>
+                </a:solidFill>
+                <a:latin typeface="DM Sans"/>
+                <a:ea typeface="DM Sans"/>
+                <a:cs typeface="DM Sans"/>
+              </a:rPr>
+              <a:t>the difference between results from original paper and our results</a:t>
             </a:r>
             <a:r>
               <a:rPr lang="it-IT" sz="1200" b="0" i="0" u="none" strike="noStrike" cap="none" spc="0">
@@ -9591,7 +9673,7 @@
       </p:grpSpPr>
       <p:sp>
         <p:nvSpPr>
-          <p:cNvPr id="1035896795" name="Google Shape;133;p28"/>
+          <p:cNvPr id="2077752018" name="Google Shape;133;p28"/>
           <p:cNvSpPr txBox="1"/>
           <p:nvPr>
             <p:ph type="title"/>
@@ -9607,7 +9689,7 @@
           </a:prstGeom>
         </p:spPr>
         <p:txBody>
-          <a:bodyPr spcFirstLastPara="1" vertOverflow="overflow" horzOverflow="overflow" vert="horz" wrap="square" lIns="91424" tIns="91424" rIns="91424" bIns="91424" numCol="1" spcCol="0" rtlCol="0" fromWordArt="0" anchor="ctr" anchorCtr="0" forceAA="0" upright="0" compatLnSpc="0">
+          <a:bodyPr spcFirstLastPara="1" vertOverflow="overflow" horzOverflow="overflow" vert="horz" wrap="square" lIns="91423" tIns="91423" rIns="91423" bIns="91423" numCol="1" spcCol="0" rtlCol="0" fromWordArt="0" anchor="ctr" anchorCtr="0" forceAA="0" upright="0" compatLnSpc="0">
             <a:noAutofit/>
           </a:bodyPr>
           <a:lstStyle/>
@@ -9650,7 +9732,7 @@
       </p:sp>
       <p:sp>
         <p:nvSpPr>
-          <p:cNvPr id="458078876" name="Google Shape;134;p28"/>
+          <p:cNvPr id="2047239609" name="Google Shape;134;p28"/>
           <p:cNvSpPr txBox="1"/>
           <p:nvPr>
             <p:ph type="title" idx="2"/>
@@ -9666,7 +9748,7 @@
           </a:prstGeom>
         </p:spPr>
         <p:txBody>
-          <a:bodyPr spcFirstLastPara="1" wrap="square" lIns="91424" tIns="91424" rIns="91424" bIns="91424" anchor="ctr" anchorCtr="0">
+          <a:bodyPr spcFirstLastPara="1" wrap="square" lIns="91423" tIns="91423" rIns="91423" bIns="91423" anchor="ctr" anchorCtr="0">
             <a:noAutofit/>
           </a:bodyPr>
           <a:lstStyle/>
@@ -9695,7 +9777,7 @@
       </p:sp>
       <p:sp>
         <p:nvSpPr>
-          <p:cNvPr id="468452264" name="Google Shape;135;p28"/>
+          <p:cNvPr id="1431340829" name="Google Shape;135;p28"/>
           <p:cNvSpPr txBox="1"/>
           <p:nvPr>
             <p:ph type="subTitle" idx="1"/>
@@ -9711,7 +9793,7 @@
           </a:prstGeom>
         </p:spPr>
         <p:txBody>
-          <a:bodyPr spcFirstLastPara="1" vertOverflow="overflow" horzOverflow="overflow" vert="horz" wrap="square" lIns="91424" tIns="91424" rIns="91424" bIns="91424" numCol="1" spcCol="0" rtlCol="0" fromWordArt="0" anchor="ctr" anchorCtr="0" forceAA="0" upright="0" compatLnSpc="0">
+          <a:bodyPr spcFirstLastPara="1" vertOverflow="overflow" horzOverflow="overflow" vert="horz" wrap="square" lIns="91423" tIns="91423" rIns="91423" bIns="91423" numCol="1" spcCol="0" rtlCol="0" fromWordArt="0" anchor="ctr" anchorCtr="0" forceAA="0" upright="0" compatLnSpc="0">
             <a:noAutofit/>
           </a:bodyPr>
           <a:lstStyle/>
@@ -9735,7 +9817,7 @@
                 <a:ea typeface="DM Sans"/>
                 <a:cs typeface="DM Sans"/>
               </a:rPr>
-              <a:t>Probing experiment that aims to better performance from regular verbalizers as seen before by tweaking the verbalizers models components. </a:t>
+              <a:t>Probing experiment that aims to better performance from regular verbalizers, as seen before, by tweaking the verbalizers models components. </a:t>
             </a:r>
             <a:endParaRPr lang="it-IT" sz="1200" b="0" i="0" u="none" strike="noStrike" cap="none" spc="0">
               <a:solidFill>
@@ -9805,7 +9887,7 @@
       </p:sp>
       <p:cxnSp>
         <p:nvCxnSpPr>
-          <p:cNvPr id="562764043" name="Google Shape;136;p28"/>
+          <p:cNvPr id="1013245822" name="Google Shape;136;p28"/>
           <p:cNvCxnSpPr/>
           <p:nvPr/>
         </p:nvCxnSpPr>
@@ -9831,7 +9913,7 @@
       </p:cxnSp>
       <p:sp>
         <p:nvSpPr>
-          <p:cNvPr id="960446515" name=""/>
+          <p:cNvPr id="1617981970" name=""/>
           <p:cNvSpPr/>
           <p:nvPr/>
         </p:nvSpPr>
@@ -9981,7 +10063,7 @@
       </p:grpSpPr>
       <p:sp>
         <p:nvSpPr>
-          <p:cNvPr id="385986548" name="Google Shape;106;p25"/>
+          <p:cNvPr id="1854785533" name="Google Shape;106;p25"/>
           <p:cNvSpPr txBox="1"/>
           <p:nvPr>
             <p:ph type="title"/>
@@ -9997,7 +10079,7 @@
           </a:prstGeom>
         </p:spPr>
         <p:txBody>
-          <a:bodyPr spcFirstLastPara="1" wrap="square" lIns="91424" tIns="91424" rIns="91424" bIns="91424" anchor="t" anchorCtr="0">
+          <a:bodyPr spcFirstLastPara="1" wrap="square" lIns="91423" tIns="91423" rIns="91423" bIns="91423" anchor="t" anchorCtr="0">
             <a:noAutofit/>
           </a:bodyPr>
           <a:lstStyle/>
@@ -10022,7 +10104,7 @@
       </p:sp>
       <p:sp>
         <p:nvSpPr>
-          <p:cNvPr id="1430077010" name="Google Shape;107;p25"/>
+          <p:cNvPr id="966075371" name="Google Shape;107;p25"/>
           <p:cNvSpPr txBox="1"/>
           <p:nvPr>
             <p:ph type="body" idx="1"/>
@@ -10038,7 +10120,7 @@
           </a:prstGeom>
         </p:spPr>
         <p:txBody>
-          <a:bodyPr spcFirstLastPara="1" wrap="square" lIns="91424" tIns="91424" rIns="91424" bIns="91424" anchor="t" anchorCtr="0">
+          <a:bodyPr spcFirstLastPara="1" wrap="square" lIns="91423" tIns="91423" rIns="91423" bIns="91423" anchor="t" anchorCtr="0">
             <a:noAutofit/>
           </a:bodyPr>
           <a:lstStyle/>
@@ -10061,7 +10143,7 @@
                 <a:ea typeface="Droid Sans Mono"/>
                 <a:cs typeface="Droid Sans Mono"/>
               </a:rPr>
-              <a:t>To evaluate this experiment PRONTO’s paper uses a completely different dataset of only positive, then builds a dataset with Reverse, Soft and Hard negatives. To fully replicate the experiment we also build a similiat dataset.</a:t>
+              <a:t>To evaluate this experiment PRONTO’s paper uses a completely different dataset of only positives, then builds a dataset with Reverse, Soft and Hard negatives. To fully replicate the experiment we also build a similiar dataset.</a:t>
             </a:r>
             <a:endParaRPr lang="it-IT" sz="1050" b="0" i="0" u="none">
               <a:solidFill>
@@ -10425,7 +10507,7 @@
       </p:grpSpPr>
       <p:sp>
         <p:nvSpPr>
-          <p:cNvPr id="1272368948" name="Google Shape;106;p25"/>
+          <p:cNvPr id="1727256157" name="Google Shape;106;p25"/>
           <p:cNvSpPr txBox="1"/>
           <p:nvPr>
             <p:ph type="title"/>
@@ -10433,15 +10515,15 @@
         </p:nvSpPr>
         <p:spPr bwMode="auto">
           <a:xfrm flipH="0" flipV="0">
-            <a:off x="186656" y="-62781"/>
-            <a:ext cx="3338812" cy="360437"/>
+            <a:off x="186656" y="-62780"/>
+            <a:ext cx="3338812" cy="360436"/>
           </a:xfrm>
           <a:prstGeom prst="rect">
             <a:avLst/>
           </a:prstGeom>
         </p:spPr>
         <p:txBody>
-          <a:bodyPr spcFirstLastPara="1" wrap="square" lIns="91424" tIns="91424" rIns="91424" bIns="91424" anchor="t" anchorCtr="0">
+          <a:bodyPr spcFirstLastPara="1" wrap="square" lIns="91423" tIns="91423" rIns="91423" bIns="91423" anchor="t" anchorCtr="0">
             <a:noAutofit/>
           </a:bodyPr>
           <a:lstStyle/>
@@ -10470,7 +10552,7 @@
       </p:sp>
       <p:sp>
         <p:nvSpPr>
-          <p:cNvPr id="380722146" name="Google Shape;107;p25"/>
+          <p:cNvPr id="1121698536" name="Google Shape;107;p25"/>
           <p:cNvSpPr txBox="1"/>
           <p:nvPr>
             <p:ph type="body" idx="1"/>
@@ -10486,7 +10568,7 @@
           </a:prstGeom>
         </p:spPr>
         <p:txBody>
-          <a:bodyPr spcFirstLastPara="1" wrap="square" lIns="91424" tIns="91424" rIns="91424" bIns="91424" anchor="t" anchorCtr="0">
+          <a:bodyPr spcFirstLastPara="1" wrap="square" lIns="91423" tIns="91423" rIns="91423" bIns="91423" anchor="t" anchorCtr="0">
             <a:noAutofit/>
           </a:bodyPr>
           <a:lstStyle/>
@@ -10591,7 +10673,7 @@
       </p:sp>
       <p:sp>
         <p:nvSpPr>
-          <p:cNvPr id="1710959585" name="Google Shape;107;p25"/>
+          <p:cNvPr id="2018529969" name="Google Shape;107;p25"/>
           <p:cNvSpPr txBox="1"/>
           <p:nvPr/>
         </p:nvSpPr>
@@ -10605,7 +10687,7 @@
           </a:prstGeom>
         </p:spPr>
         <p:txBody>
-          <a:bodyPr spcFirstLastPara="1" wrap="square" lIns="91424" tIns="91424" rIns="91424" bIns="91424" anchor="t" anchorCtr="0">
+          <a:bodyPr spcFirstLastPara="1" wrap="square" lIns="91423" tIns="91423" rIns="91423" bIns="91423" anchor="t" anchorCtr="0">
             <a:noAutofit/>
           </a:bodyPr>
           <a:lstStyle>
@@ -11038,7 +11120,7 @@
       </p:sp>
       <p:pic>
         <p:nvPicPr>
-          <p:cNvPr id="2091828165" name=""/>
+          <p:cNvPr id="1249324964" name=""/>
           <p:cNvPicPr>
             <a:picLocks noChangeAspect="1"/>
           </p:cNvPicPr>
@@ -11051,7 +11133,7 @@
         <p:spPr bwMode="auto">
           <a:xfrm flipH="0" flipV="0">
             <a:off x="5009560" y="915330"/>
-            <a:ext cx="3765917" cy="566204"/>
+            <a:ext cx="3765916" cy="566204"/>
           </a:xfrm>
           <a:prstGeom prst="rect">
             <a:avLst/>
@@ -11060,7 +11142,7 @@
       </p:pic>
       <p:sp>
         <p:nvSpPr>
-          <p:cNvPr id="642474827" name="Google Shape;107;p25"/>
+          <p:cNvPr id="659261545" name="Google Shape;107;p25"/>
           <p:cNvSpPr txBox="1"/>
           <p:nvPr/>
         </p:nvSpPr>
@@ -11074,7 +11156,7 @@
           </a:prstGeom>
         </p:spPr>
         <p:txBody>
-          <a:bodyPr spcFirstLastPara="1" wrap="square" lIns="91424" tIns="91424" rIns="91424" bIns="91424" anchor="t" anchorCtr="0">
+          <a:bodyPr spcFirstLastPara="1" wrap="square" lIns="91423" tIns="91423" rIns="91423" bIns="91423" anchor="t" anchorCtr="0">
             <a:noAutofit/>
           </a:bodyPr>
           <a:lstStyle>
@@ -11416,7 +11498,7 @@
       </p:sp>
       <p:pic>
         <p:nvPicPr>
-          <p:cNvPr id="1525372227" name=""/>
+          <p:cNvPr id="499154131" name=""/>
           <p:cNvPicPr>
             <a:picLocks noChangeAspect="1"/>
           </p:cNvPicPr>
@@ -11438,7 +11520,7 @@
       </p:pic>
       <p:pic>
         <p:nvPicPr>
-          <p:cNvPr id="95872268" name=""/>
+          <p:cNvPr id="1779192923" name=""/>
           <p:cNvPicPr>
             <a:picLocks noChangeAspect="1"/>
           </p:cNvPicPr>
@@ -11460,7 +11542,7 @@
       </p:pic>
       <p:cxnSp>
         <p:nvCxnSpPr>
-          <p:cNvPr id="1494258882" name=""/>
+          <p:cNvPr id="2054856363" name=""/>
           <p:cNvCxnSpPr/>
           <p:nvPr/>
         </p:nvCxnSpPr>
@@ -11492,7 +11574,7 @@
       </p:cxnSp>
       <p:cxnSp>
         <p:nvCxnSpPr>
-          <p:cNvPr id="143547454" name=""/>
+          <p:cNvPr id="1136029274" name=""/>
           <p:cNvCxnSpPr/>
           <p:nvPr/>
         </p:nvCxnSpPr>
@@ -11524,7 +11606,7 @@
       </p:cxnSp>
       <p:cxnSp>
         <p:nvCxnSpPr>
-          <p:cNvPr id="2055466582" name=""/>
+          <p:cNvPr id="1150756943" name=""/>
           <p:cNvCxnSpPr/>
           <p:nvPr/>
         </p:nvCxnSpPr>
@@ -11556,7 +11638,7 @@
       </p:cxnSp>
       <p:sp>
         <p:nvSpPr>
-          <p:cNvPr id="607585575" name="Google Shape;107;p25"/>
+          <p:cNvPr id="1851101115" name="Google Shape;107;p25"/>
           <p:cNvSpPr txBox="1"/>
           <p:nvPr/>
         </p:nvSpPr>
@@ -11570,7 +11652,7 @@
           </a:prstGeom>
         </p:spPr>
         <p:txBody>
-          <a:bodyPr spcFirstLastPara="1" wrap="square" lIns="91424" tIns="91424" rIns="91424" bIns="91424" anchor="t" anchorCtr="0">
+          <a:bodyPr spcFirstLastPara="1" wrap="square" lIns="91423" tIns="91423" rIns="91423" bIns="91423" anchor="t" anchorCtr="0">
             <a:noAutofit/>
           </a:bodyPr>
           <a:lstStyle>
@@ -12023,7 +12105,29 @@
                 <a:ea typeface="DM Sans"/>
                 <a:cs typeface="DM Sans"/>
               </a:rPr>
-              <a:t>where w are parameters learned jointly in the optimization process and constrained in the [0, 1] range</a:t>
+              <a:t>where</a:t>
+            </a:r>
+            <a:r>
+              <a:rPr lang="it-IT" sz="1200" b="1" i="0" u="none" strike="noStrike" cap="none" spc="0">
+                <a:solidFill>
+                  <a:schemeClr val="tx1"/>
+                </a:solidFill>
+                <a:latin typeface="DM Sans"/>
+                <a:ea typeface="DM Sans"/>
+                <a:cs typeface="DM Sans"/>
+              </a:rPr>
+              <a:t> w are parameters learned jointly in the optimization process</a:t>
+            </a:r>
+            <a:r>
+              <a:rPr lang="it-IT" sz="1200" b="0" i="0" u="none" strike="noStrike" cap="none" spc="0">
+                <a:solidFill>
+                  <a:schemeClr val="tx1"/>
+                </a:solidFill>
+                <a:latin typeface="DM Sans"/>
+                <a:ea typeface="DM Sans"/>
+                <a:cs typeface="DM Sans"/>
+              </a:rPr>
+              <a:t> and constrained in the [0, 1] range</a:t>
             </a:r>
             <a:r>
               <a:rPr lang="it-IT" sz="1200" b="0" i="0" u="none" strike="noStrike" cap="none" spc="0">
@@ -12101,7 +12205,7 @@
       </p:sp>
       <p:pic>
         <p:nvPicPr>
-          <p:cNvPr id="267110574" name=""/>
+          <p:cNvPr id="1693013391" name=""/>
           <p:cNvPicPr>
             <a:picLocks noChangeAspect="1"/>
           </p:cNvPicPr>
@@ -12123,7 +12227,7 @@
       </p:pic>
       <p:pic>
         <p:nvPicPr>
-          <p:cNvPr id="1982638702" name=""/>
+          <p:cNvPr id="1970951427" name=""/>
           <p:cNvPicPr>
             <a:picLocks noChangeAspect="1"/>
           </p:cNvPicPr>
@@ -12178,7 +12282,7 @@
       </p:grpSpPr>
       <p:sp>
         <p:nvSpPr>
-          <p:cNvPr id="120455908" name="Google Shape;106;p25"/>
+          <p:cNvPr id="1550149069" name="Google Shape;106;p25"/>
           <p:cNvSpPr txBox="1"/>
           <p:nvPr>
             <p:ph type="title"/>
@@ -12194,7 +12298,7 @@
           </a:prstGeom>
         </p:spPr>
         <p:txBody>
-          <a:bodyPr spcFirstLastPara="1" wrap="square" lIns="91424" tIns="91424" rIns="91424" bIns="91424" anchor="t" anchorCtr="0">
+          <a:bodyPr spcFirstLastPara="1" wrap="square" lIns="91423" tIns="91423" rIns="91423" bIns="91423" anchor="t" anchorCtr="0">
             <a:noAutofit/>
           </a:bodyPr>
           <a:lstStyle/>
@@ -12227,7 +12331,7 @@
       </p:sp>
       <p:graphicFrame>
         <p:nvGraphicFramePr>
-          <p:cNvPr id="285538563" name="Google Shape;108;p25"/>
+          <p:cNvPr id="818288705" name="Google Shape;108;p25"/>
           <p:cNvGraphicFramePr>
             <a:graphicFrameLocks xmlns:a="http://schemas.openxmlformats.org/drawingml/2006/main"/>
           </p:cNvGraphicFramePr>
@@ -12280,7 +12384,7 @@
                       </a:endParaRPr>
                     </a:p>
                   </a:txBody>
-                  <a:tcPr marL="91424" marR="91424" marT="0" marB="0" anchor="ctr">
+                  <a:tcPr marL="91423" marR="91423" marT="0" marB="0" anchor="ctr">
                     <a:lnL w="9524" algn="ctr">
                       <a:solidFill>
                         <a:schemeClr val="dk1"/>
@@ -12341,7 +12445,7 @@
                       </a:endParaRPr>
                     </a:p>
                   </a:txBody>
-                  <a:tcPr marL="91424" marR="91424" marT="0" marB="0" anchor="ctr">
+                  <a:tcPr marL="91423" marR="91423" marT="0" marB="0" anchor="ctr">
                     <a:lnL w="9524" algn="ctr">
                       <a:solidFill>
                         <a:schemeClr val="dk1"/>
@@ -12403,7 +12507,7 @@
                       </a:endParaRPr>
                     </a:p>
                   </a:txBody>
-                  <a:tcPr marL="91424" marR="91424" marT="0" marB="0" anchor="ctr">
+                  <a:tcPr marL="91423" marR="91423" marT="0" marB="0" anchor="ctr">
                     <a:lnL w="9524" algn="ctr">
                       <a:solidFill>
                         <a:schemeClr val="dk1"/>
@@ -12465,7 +12569,7 @@
                       </a:endParaRPr>
                     </a:p>
                   </a:txBody>
-                  <a:tcPr marL="91424" marR="91424" marT="0" marB="0" anchor="ctr">
+                  <a:tcPr marL="91423" marR="91423" marT="0" marB="0" anchor="ctr">
                     <a:lnL w="9524" algn="ctr">
                       <a:solidFill>
                         <a:schemeClr val="dk1"/>
@@ -12527,7 +12631,7 @@
                       </a:endParaRPr>
                     </a:p>
                   </a:txBody>
-                  <a:tcPr marL="91424" marR="91424" marT="0" marB="0" anchor="ctr">
+                  <a:tcPr marL="91423" marR="91423" marT="0" marB="0" anchor="ctr">
                     <a:lnL w="9524" algn="ctr">
                       <a:solidFill>
                         <a:schemeClr val="dk1"/>
@@ -12573,7 +12677,7 @@
                       <a:endParaRPr/>
                     </a:p>
                   </a:txBody>
-                  <a:tcPr marL="91424" marR="91424" marT="0" marB="0" anchor="ctr">
+                  <a:tcPr marL="91423" marR="91423" marT="0" marB="0" anchor="ctr">
                     <a:lnL w="9524" algn="ctr">
                       <a:solidFill>
                         <a:schemeClr val="dk1"/>
@@ -12634,7 +12738,7 @@
                       </a:endParaRPr>
                     </a:p>
                   </a:txBody>
-                  <a:tcPr marL="91424" marR="91424" marT="0" marB="0" anchor="ctr">
+                  <a:tcPr marL="91423" marR="91423" marT="0" marB="0" anchor="ctr">
                     <a:lnL w="9524" algn="ctr">
                       <a:solidFill>
                         <a:schemeClr val="dk1"/>
@@ -12695,7 +12799,7 @@
                       </a:endParaRPr>
                     </a:p>
                   </a:txBody>
-                  <a:tcPr marL="91424" marR="91424" marT="0" marB="0" anchor="ctr">
+                  <a:tcPr marL="91423" marR="91423" marT="0" marB="0" anchor="ctr">
                     <a:lnL w="9524" algn="ctr">
                       <a:solidFill>
                         <a:schemeClr val="dk1"/>
@@ -12756,7 +12860,7 @@
                       </a:endParaRPr>
                     </a:p>
                   </a:txBody>
-                  <a:tcPr marL="91424" marR="91424" marT="0" marB="0" anchor="ctr">
+                  <a:tcPr marL="91423" marR="91423" marT="0" marB="0" anchor="ctr">
                     <a:lnL w="9524" algn="ctr">
                       <a:solidFill>
                         <a:schemeClr val="dk1"/>
@@ -12817,7 +12921,7 @@
                       </a:endParaRPr>
                     </a:p>
                   </a:txBody>
-                  <a:tcPr marL="91424" marR="91424" marT="0" marB="0" anchor="ctr">
+                  <a:tcPr marL="91423" marR="91423" marT="0" marB="0" anchor="ctr">
                     <a:lnL w="9524" algn="ctr">
                       <a:solidFill>
                         <a:schemeClr val="dk1"/>
@@ -12878,7 +12982,7 @@
                       </a:endParaRPr>
                     </a:p>
                   </a:txBody>
-                  <a:tcPr marL="91424" marR="91424" marT="0" marB="0" anchor="ctr">
+                  <a:tcPr marL="91423" marR="91423" marT="0" marB="0" anchor="ctr">
                     <a:lnL w="9524" algn="ctr">
                       <a:solidFill>
                         <a:schemeClr val="dk1"/>
@@ -12939,7 +13043,7 @@
                       </a:endParaRPr>
                     </a:p>
                   </a:txBody>
-                  <a:tcPr marL="91424" marR="91424" marT="0" marB="0" anchor="ctr">
+                  <a:tcPr marL="91423" marR="91423" marT="0" marB="0" anchor="ctr">
                     <a:lnL w="9524" algn="ctr">
                       <a:solidFill>
                         <a:schemeClr val="dk1"/>
@@ -13000,7 +13104,7 @@
                       </a:endParaRPr>
                     </a:p>
                   </a:txBody>
-                  <a:tcPr marL="91424" marR="91424" marT="0" marB="0" anchor="ctr">
+                  <a:tcPr marL="91423" marR="91423" marT="0" marB="0" anchor="ctr">
                     <a:lnL w="9524" algn="ctr">
                       <a:solidFill>
                         <a:schemeClr val="dk1"/>
@@ -13061,7 +13165,7 @@
                       </a:endParaRPr>
                     </a:p>
                   </a:txBody>
-                  <a:tcPr marL="91424" marR="91424" marT="0" marB="0" anchor="ctr">
+                  <a:tcPr marL="91423" marR="91423" marT="0" marB="0" anchor="ctr">
                     <a:lnL w="9524" algn="ctr">
                       <a:solidFill>
                         <a:schemeClr val="dk1"/>
@@ -13124,7 +13228,7 @@
                       </a:endParaRPr>
                     </a:p>
                   </a:txBody>
-                  <a:tcPr marL="91424" marR="91424" marT="0" marB="0" anchor="ctr">
+                  <a:tcPr marL="91423" marR="91423" marT="0" marB="0" anchor="ctr">
                     <a:lnL w="9524" algn="ctr">
                       <a:solidFill>
                         <a:schemeClr val="dk1"/>
@@ -13188,7 +13292,7 @@
                       </a:endParaRPr>
                     </a:p>
                   </a:txBody>
-                  <a:tcPr marL="91424" marR="91424" marT="0" marB="0" anchor="ctr">
+                  <a:tcPr marL="91423" marR="91423" marT="0" marB="0" anchor="ctr">
                     <a:lnL w="9524" algn="ctr">
                       <a:solidFill>
                         <a:schemeClr val="dk1"/>
@@ -13252,7 +13356,7 @@
                       </a:endParaRPr>
                     </a:p>
                   </a:txBody>
-                  <a:tcPr marL="91424" marR="91424" marT="0" marB="0" anchor="ctr">
+                  <a:tcPr marL="91423" marR="91423" marT="0" marB="0" anchor="ctr">
                     <a:lnL w="9524" algn="ctr">
                       <a:solidFill>
                         <a:schemeClr val="dk1"/>
@@ -13316,7 +13420,7 @@
                       </a:endParaRPr>
                     </a:p>
                   </a:txBody>
-                  <a:tcPr marL="91424" marR="91424" marT="0" marB="0" anchor="ctr">
+                  <a:tcPr marL="91423" marR="91423" marT="0" marB="0" anchor="ctr">
                     <a:lnL w="9524" algn="ctr">
                       <a:solidFill>
                         <a:schemeClr val="dk1"/>
@@ -13380,7 +13484,7 @@
                       </a:endParaRPr>
                     </a:p>
                   </a:txBody>
-                  <a:tcPr marL="91424" marR="91424" marT="0" marB="0" anchor="ctr">
+                  <a:tcPr marL="91423" marR="91423" marT="0" marB="0" anchor="ctr">
                     <a:lnL w="9524" algn="ctr">
                       <a:solidFill>
                         <a:schemeClr val="dk1"/>
@@ -13444,7 +13548,7 @@
                       </a:endParaRPr>
                     </a:p>
                   </a:txBody>
-                  <a:tcPr marL="91424" marR="91424" marT="0" marB="0" anchor="ctr">
+                  <a:tcPr marL="91423" marR="91423" marT="0" marB="0" anchor="ctr">
                     <a:lnL w="9524" algn="ctr">
                       <a:solidFill>
                         <a:schemeClr val="dk1"/>
@@ -13508,7 +13612,7 @@
                       </a:endParaRPr>
                     </a:p>
                   </a:txBody>
-                  <a:tcPr marL="91424" marR="91424" marT="0" marB="0" anchor="ctr">
+                  <a:tcPr marL="91423" marR="91423" marT="0" marB="0" anchor="ctr">
                     <a:lnL w="9524" algn="ctr">
                       <a:solidFill>
                         <a:schemeClr val="dk1"/>
@@ -13572,7 +13676,7 @@
                       </a:endParaRPr>
                     </a:p>
                   </a:txBody>
-                  <a:tcPr marL="91424" marR="91424" marT="0" marB="0" anchor="ctr">
+                  <a:tcPr marL="91423" marR="91423" marT="0" marB="0" anchor="ctr">
                     <a:lnL w="9524" algn="ctr">
                       <a:solidFill>
                         <a:schemeClr val="dk1"/>
@@ -13636,7 +13740,7 @@
                       </a:endParaRPr>
                     </a:p>
                   </a:txBody>
-                  <a:tcPr marL="91424" marR="91424" marT="0" marB="0" anchor="ctr">
+                  <a:tcPr marL="91423" marR="91423" marT="0" marB="0" anchor="ctr">
                     <a:lnL w="9524" algn="ctr">
                       <a:solidFill>
                         <a:schemeClr val="dk1"/>
@@ -13701,7 +13805,7 @@
                       </a:endParaRPr>
                     </a:p>
                   </a:txBody>
-                  <a:tcPr marL="91424" marR="91424" marT="0" marB="0" anchor="ctr">
+                  <a:tcPr marL="91423" marR="91423" marT="0" marB="0" anchor="ctr">
                     <a:lnL w="9524" algn="ctr">
                       <a:solidFill>
                         <a:schemeClr val="dk1"/>
@@ -13763,7 +13867,7 @@
                       <a:endParaRPr sz="1200" b="0"/>
                     </a:p>
                   </a:txBody>
-                  <a:tcPr marL="91424" marR="91424" marT="0" marB="0" anchor="ctr">
+                  <a:tcPr marL="91423" marR="91423" marT="0" marB="0" anchor="ctr">
                     <a:lnL w="9524" algn="ctr">
                       <a:solidFill>
                         <a:schemeClr val="dk1"/>
@@ -13833,7 +13937,7 @@
                       <a:endParaRPr sz="1200" b="0"/>
                     </a:p>
                   </a:txBody>
-                  <a:tcPr marL="91424" marR="91424" marT="0" marB="0" anchor="ctr">
+                  <a:tcPr marL="91423" marR="91423" marT="0" marB="0" anchor="ctr">
                     <a:lnL w="9524" algn="ctr">
                       <a:solidFill>
                         <a:schemeClr val="dk1"/>
@@ -13889,7 +13993,7 @@
                       </a:endParaRPr>
                     </a:p>
                   </a:txBody>
-                  <a:tcPr marL="91424" marR="91424" marT="0" marB="0" anchor="ctr">
+                  <a:tcPr marL="91423" marR="91423" marT="0" marB="0" anchor="ctr">
                     <a:lnL w="9524" algn="ctr">
                       <a:solidFill>
                         <a:schemeClr val="dk1"/>
@@ -13966,7 +14070,7 @@
                       </a:endParaRPr>
                     </a:p>
                   </a:txBody>
-                  <a:tcPr marL="91424" marR="91424" marT="0" marB="0" anchor="ctr">
+                  <a:tcPr marL="91423" marR="91423" marT="0" marB="0" anchor="ctr">
                     <a:lnL w="9524" algn="ctr">
                       <a:solidFill>
                         <a:schemeClr val="dk1"/>
@@ -14022,7 +14126,7 @@
                       </a:endParaRPr>
                     </a:p>
                   </a:txBody>
-                  <a:tcPr marL="91424" marR="91424" marT="0" marB="0" anchor="ctr">
+                  <a:tcPr marL="91423" marR="91423" marT="0" marB="0" anchor="ctr">
                     <a:lnL w="9524" algn="ctr">
                       <a:solidFill>
                         <a:schemeClr val="dk1"/>
@@ -14099,7 +14203,7 @@
                       </a:endParaRPr>
                     </a:p>
                   </a:txBody>
-                  <a:tcPr marL="91424" marR="91424" marT="0" marB="0" anchor="ctr">
+                  <a:tcPr marL="91423" marR="91423" marT="0" marB="0" anchor="ctr">
                     <a:lnL w="9524" algn="ctr">
                       <a:solidFill>
                         <a:schemeClr val="dk1"/>
@@ -14155,7 +14259,7 @@
                       </a:endParaRPr>
                     </a:p>
                   </a:txBody>
-                  <a:tcPr marL="91424" marR="91424" marT="0" marB="0" anchor="ctr">
+                  <a:tcPr marL="91423" marR="91423" marT="0" marB="0" anchor="ctr">
                     <a:lnL w="9524" algn="ctr">
                       <a:solidFill>
                         <a:schemeClr val="dk1"/>
@@ -14235,7 +14339,7 @@
                       </a:endParaRPr>
                     </a:p>
                   </a:txBody>
-                  <a:tcPr marL="91424" marR="91424" marT="0" marB="0" anchor="ctr">
+                  <a:tcPr marL="91423" marR="91423" marT="0" marB="0" anchor="ctr">
                     <a:lnL w="9524" algn="ctr">
                       <a:solidFill>
                         <a:schemeClr val="dk1"/>
@@ -14300,7 +14404,7 @@
                       </a:endParaRPr>
                     </a:p>
                   </a:txBody>
-                  <a:tcPr marL="91424" marR="91424" marT="0" marB="0" anchor="ctr">
+                  <a:tcPr marL="91423" marR="91423" marT="0" marB="0" anchor="ctr">
                     <a:lnL w="9524" algn="ctr">
                       <a:solidFill>
                         <a:schemeClr val="dk1"/>
@@ -14363,7 +14467,7 @@
                       </a:endParaRPr>
                     </a:p>
                   </a:txBody>
-                  <a:tcPr marL="91424" marR="91424" marT="0" marB="0" anchor="ctr">
+                  <a:tcPr marL="91423" marR="91423" marT="0" marB="0" anchor="ctr">
                     <a:lnL w="9524" algn="ctr">
                       <a:solidFill>
                         <a:schemeClr val="dk1"/>
@@ -14447,7 +14551,7 @@
                       </a:endParaRPr>
                     </a:p>
                   </a:txBody>
-                  <a:tcPr marL="91424" marR="91424" marT="0" marB="0" anchor="ctr">
+                  <a:tcPr marL="91423" marR="91423" marT="0" marB="0" anchor="ctr">
                     <a:lnL w="9524" algn="ctr">
                       <a:solidFill>
                         <a:schemeClr val="dk1"/>
@@ -14503,7 +14607,7 @@
                       </a:endParaRPr>
                     </a:p>
                   </a:txBody>
-                  <a:tcPr marL="91424" marR="91424" marT="0" marB="0" anchor="ctr">
+                  <a:tcPr marL="91423" marR="91423" marT="0" marB="0" anchor="ctr">
                     <a:lnL w="9524" algn="ctr">
                       <a:solidFill>
                         <a:schemeClr val="dk1"/>
@@ -14580,7 +14684,7 @@
                       </a:endParaRPr>
                     </a:p>
                   </a:txBody>
-                  <a:tcPr marL="91424" marR="91424" marT="0" marB="0" anchor="ctr">
+                  <a:tcPr marL="91423" marR="91423" marT="0" marB="0" anchor="ctr">
                     <a:lnL w="9524" algn="ctr">
                       <a:solidFill>
                         <a:schemeClr val="dk1"/>
@@ -14636,7 +14740,7 @@
                       </a:endParaRPr>
                     </a:p>
                   </a:txBody>
-                  <a:tcPr marL="91424" marR="91424" marT="0" marB="0" anchor="ctr">
+                  <a:tcPr marL="91423" marR="91423" marT="0" marB="0" anchor="ctr">
                     <a:lnL w="9524" algn="ctr">
                       <a:solidFill>
                         <a:schemeClr val="dk1"/>
@@ -14713,7 +14817,7 @@
                       </a:endParaRPr>
                     </a:p>
                   </a:txBody>
-                  <a:tcPr marL="91424" marR="91424" marT="0" marB="0" anchor="ctr">
+                  <a:tcPr marL="91423" marR="91423" marT="0" marB="0" anchor="ctr">
                     <a:lnL w="9524" algn="ctr">
                       <a:solidFill>
                         <a:schemeClr val="dk1"/>
@@ -14769,7 +14873,7 @@
                       </a:endParaRPr>
                     </a:p>
                   </a:txBody>
-                  <a:tcPr marL="91424" marR="91424" marT="0" marB="0" anchor="ctr">
+                  <a:tcPr marL="91423" marR="91423" marT="0" marB="0" anchor="ctr">
                     <a:lnL w="9524" algn="ctr">
                       <a:solidFill>
                         <a:schemeClr val="dk1"/>
@@ -14849,7 +14953,7 @@
                       </a:endParaRPr>
                     </a:p>
                   </a:txBody>
-                  <a:tcPr marL="91424" marR="91424" marT="0" marB="0" anchor="ctr">
+                  <a:tcPr marL="91423" marR="91423" marT="0" marB="0" anchor="ctr">
                     <a:lnL w="9524" algn="ctr">
                       <a:solidFill>
                         <a:schemeClr val="dk1"/>
@@ -14884,7 +14988,7 @@
       </p:graphicFrame>
       <p:sp>
         <p:nvSpPr>
-          <p:cNvPr id="2102539996" name="Google Shape;107;p25"/>
+          <p:cNvPr id="475302118" name="Google Shape;107;p25"/>
           <p:cNvSpPr txBox="1"/>
           <p:nvPr>
             <p:ph type="body" idx="1"/>
@@ -14900,7 +15004,7 @@
           </a:prstGeom>
         </p:spPr>
         <p:txBody>
-          <a:bodyPr spcFirstLastPara="1" wrap="square" lIns="91424" tIns="91424" rIns="91424" bIns="91424" anchor="t" anchorCtr="0">
+          <a:bodyPr spcFirstLastPara="1" wrap="square" lIns="91423" tIns="91423" rIns="91423" bIns="91423" anchor="t" anchorCtr="0">
             <a:noAutofit/>
           </a:bodyPr>
           <a:lstStyle/>
@@ -14954,7 +15058,7 @@
                 <a:ea typeface="DM Sans"/>
                 <a:cs typeface="DM Sans"/>
               </a:rPr>
-              <a:t>ee, for this experiment, most verbalizers from our experiment exactly replicate results from PRONTO’s paper having minimal difference, only one that has quite differences in accuracy is WS verbalizer (wich could easily be justified by the fact that that’s the more calculation heavy verbalizer and we have a totally different dataset).</a:t>
+              <a:t>ee, for this experiment, most verbalizers from our experiment exactly replicate results from PRONTO’s paper having minimal difference. Only one that has quite differences in accuracy is WS verbalizer (wich could easily be justified by the fact that that’s the more calculation heavy verbalizer and we have a totally different dataset).</a:t>
             </a:r>
             <a:endParaRPr lang="it-IT" sz="1200" b="0" i="0" u="none" strike="noStrike" cap="none" spc="0">
               <a:solidFill>
@@ -15200,7 +15304,7 @@
       </p:grpSpPr>
       <p:sp>
         <p:nvSpPr>
-          <p:cNvPr id="1067268225" name="Google Shape;133;p28"/>
+          <p:cNvPr id="237049559" name="Google Shape;133;p28"/>
           <p:cNvSpPr txBox="1"/>
           <p:nvPr>
             <p:ph type="title"/>
@@ -15216,7 +15320,7 @@
           </a:prstGeom>
         </p:spPr>
         <p:txBody>
-          <a:bodyPr spcFirstLastPara="1" vertOverflow="overflow" horzOverflow="overflow" vert="horz" wrap="square" lIns="91424" tIns="91424" rIns="91424" bIns="91424" numCol="1" spcCol="0" rtlCol="0" fromWordArt="0" anchor="ctr" anchorCtr="0" forceAA="0" upright="0" compatLnSpc="0">
+          <a:bodyPr spcFirstLastPara="1" vertOverflow="overflow" horzOverflow="overflow" vert="horz" wrap="square" lIns="91423" tIns="91423" rIns="91423" bIns="91423" numCol="1" spcCol="0" rtlCol="0" fromWordArt="0" anchor="ctr" anchorCtr="0" forceAA="0" upright="0" compatLnSpc="0">
             <a:noAutofit/>
           </a:bodyPr>
           <a:lstStyle/>
@@ -15248,7 +15352,7 @@
       </p:sp>
       <p:sp>
         <p:nvSpPr>
-          <p:cNvPr id="658298261" name="Google Shape;134;p28"/>
+          <p:cNvPr id="185597036" name="Google Shape;134;p28"/>
           <p:cNvSpPr txBox="1"/>
           <p:nvPr>
             <p:ph type="title" idx="2"/>
@@ -15264,7 +15368,7 @@
           </a:prstGeom>
         </p:spPr>
         <p:txBody>
-          <a:bodyPr spcFirstLastPara="1" wrap="square" lIns="91424" tIns="91424" rIns="91424" bIns="91424" anchor="ctr" anchorCtr="0">
+          <a:bodyPr spcFirstLastPara="1" wrap="square" lIns="91423" tIns="91423" rIns="91423" bIns="91423" anchor="ctr" anchorCtr="0">
             <a:noAutofit/>
           </a:bodyPr>
           <a:lstStyle/>
@@ -15293,7 +15397,7 @@
       </p:sp>
       <p:cxnSp>
         <p:nvCxnSpPr>
-          <p:cNvPr id="144831292" name="Google Shape;136;p28"/>
+          <p:cNvPr id="2112133287" name="Google Shape;136;p28"/>
           <p:cNvCxnSpPr/>
           <p:nvPr/>
         </p:nvCxnSpPr>
@@ -15319,7 +15423,7 @@
       </p:cxnSp>
       <p:sp>
         <p:nvSpPr>
-          <p:cNvPr id="2121120850" name=""/>
+          <p:cNvPr id="291635626" name=""/>
           <p:cNvSpPr/>
           <p:nvPr/>
         </p:nvSpPr>
@@ -15359,14 +15463,14 @@
       </p:sp>
       <p:sp>
         <p:nvSpPr>
-          <p:cNvPr id="969144113" name=""/>
+          <p:cNvPr id="2144517770" name=""/>
           <p:cNvSpPr/>
           <p:nvPr/>
         </p:nvSpPr>
         <p:spPr bwMode="auto">
           <a:xfrm rot="0" flipH="0" flipV="0">
             <a:off x="763737" y="2381249"/>
-            <a:ext cx="7683387" cy="2000249"/>
+            <a:ext cx="7683387" cy="2000248"/>
           </a:xfrm>
           <a:prstGeom prst="rect">
             <a:avLst/>
@@ -15408,14 +15512,14 @@
       </p:sp>
       <p:sp>
         <p:nvSpPr>
-          <p:cNvPr id="1227550747" name=""/>
+          <p:cNvPr id="1140464843" name=""/>
           <p:cNvSpPr txBox="1"/>
           <p:nvPr/>
         </p:nvSpPr>
         <p:spPr bwMode="auto">
           <a:xfrm rot="0" flipH="0" flipV="0">
-            <a:off x="1176374" y="2619374"/>
-            <a:ext cx="6890469" cy="1585319"/>
+            <a:off x="1176373" y="2619373"/>
+            <a:ext cx="6892988" cy="1585319"/>
           </a:xfrm>
           <a:prstGeom prst="rect">
             <a:avLst/>
@@ -15432,7 +15536,7 @@
             </a:pPr>
             <a:r>
               <a:rPr lang="it-IT"/>
-              <a:t>Even throug some experiments got a few percentage of accuracy below expected results from papers, all experiments performed in a similar way of what we’d expect. Also since we used different dataset for some of this experiments we are completely satisfied by the results.</a:t>
+              <a:t>Even throug some experiments got a few percentage of accuracy below expected results from papers, all experiments performed in a similar way of what we’d expect. Also since we used different datasets for some of this experiments we are completely satisfied by the results.</a:t>
             </a:r>
             <a:endParaRPr lang="it-IT"/>
           </a:p>
@@ -15448,19 +15552,14 @@
             </a:pPr>
             <a:r>
               <a:rPr lang="it-IT"/>
-              <a:t>More evaluations of said results can be foung here:</a:t>
+              <a:t>More evaluations of said results can be found here:</a:t>
             </a:r>
             <a:br>
               <a:rPr lang="it-IT"/>
             </a:br>
             <a:r>
-              <a:rPr lang="it-IT" sz="1400" b="0" i="0" u="none" strike="noStrike" cap="none" spc="0">
-                <a:solidFill>
-                  <a:srgbClr val="00B0F0"/>
-                </a:solidFill>
-                <a:latin typeface="Arial"/>
-                <a:ea typeface="Arial"/>
-                <a:cs typeface="Arial"/>
+              <a:rPr lang="it-IT" u="sng">
+                <a:hlinkClick r:id="rId3" tooltip=""/>
               </a:rPr>
               <a:t>https://vr3ed.github.io/data-semantics-project/</a:t>
             </a:r>
@@ -15503,7 +15602,7 @@
       </p:grpSpPr>
       <p:sp>
         <p:nvSpPr>
-          <p:cNvPr id="1900134791" name="Google Shape;164;p32"/>
+          <p:cNvPr id="729569805" name="Google Shape;164;p32"/>
           <p:cNvSpPr txBox="1"/>
           <p:nvPr>
             <p:ph type="title"/>
@@ -15544,7 +15643,7 @@
       </p:sp>
       <p:sp>
         <p:nvSpPr>
-          <p:cNvPr id="1688024390" name="Google Shape;165;p32"/>
+          <p:cNvPr id="53795719" name="Google Shape;165;p32"/>
           <p:cNvSpPr txBox="1"/>
           <p:nvPr>
             <p:ph type="subTitle" idx="1"/>
@@ -15560,7 +15659,7 @@
           </a:prstGeom>
         </p:spPr>
         <p:txBody>
-          <a:bodyPr spcFirstLastPara="1" vertOverflow="overflow" horzOverflow="overflow" vert="horz" wrap="square" lIns="91424" tIns="91424" rIns="91424" bIns="91424" numCol="1" spcCol="0" rtlCol="0" fromWordArt="0" anchor="t" anchorCtr="0" forceAA="0" upright="0" compatLnSpc="0">
+          <a:bodyPr spcFirstLastPara="1" vertOverflow="overflow" horzOverflow="overflow" vert="horz" wrap="square" lIns="91423" tIns="91423" rIns="91423" bIns="91423" numCol="1" spcCol="0" rtlCol="0" fromWordArt="0" anchor="t" anchorCtr="0" forceAA="0" upright="0" compatLnSpc="0">
             <a:noAutofit/>
           </a:bodyPr>
           <a:lstStyle/>
@@ -15675,7 +15774,7 @@
       </p:sp>
       <p:cxnSp>
         <p:nvCxnSpPr>
-          <p:cNvPr id="1875673742" name="Google Shape;166;p32"/>
+          <p:cNvPr id="1898392517" name="Google Shape;166;p32"/>
           <p:cNvCxnSpPr/>
           <p:nvPr/>
         </p:nvCxnSpPr>
@@ -15734,7 +15833,7 @@
       </p:grpSpPr>
       <p:sp>
         <p:nvSpPr>
-          <p:cNvPr id="1092520298" name="Google Shape;164;p32"/>
+          <p:cNvPr id="1478869924" name="Google Shape;164;p32"/>
           <p:cNvSpPr txBox="1"/>
           <p:nvPr>
             <p:ph type="title"/>
@@ -15742,7 +15841,7 @@
         </p:nvSpPr>
         <p:spPr bwMode="auto">
           <a:xfrm>
-            <a:off x="571474" y="521224"/>
+            <a:off x="571474" y="521223"/>
             <a:ext cx="8001000" cy="573300"/>
           </a:xfrm>
           <a:prstGeom prst="rect">
@@ -15750,7 +15849,7 @@
           </a:prstGeom>
         </p:spPr>
         <p:txBody>
-          <a:bodyPr spcFirstLastPara="1" wrap="square" lIns="91424" tIns="91424" rIns="91424" bIns="91424" anchor="t" anchorCtr="0">
+          <a:bodyPr spcFirstLastPara="1" wrap="square" lIns="91423" tIns="91423" rIns="91423" bIns="91423" anchor="t" anchorCtr="0">
             <a:noAutofit/>
           </a:bodyPr>
           <a:lstStyle/>
@@ -15775,7 +15874,7 @@
       </p:sp>
       <p:sp>
         <p:nvSpPr>
-          <p:cNvPr id="1617676404" name="Google Shape;165;p32"/>
+          <p:cNvPr id="253529967" name="Google Shape;165;p32"/>
           <p:cNvSpPr txBox="1"/>
           <p:nvPr>
             <p:ph type="subTitle" idx="1"/>
@@ -15791,7 +15890,7 @@
           </a:prstGeom>
         </p:spPr>
         <p:txBody>
-          <a:bodyPr spcFirstLastPara="1" vertOverflow="overflow" horzOverflow="overflow" vert="horz" wrap="square" lIns="91424" tIns="91424" rIns="91424" bIns="91424" numCol="1" spcCol="0" rtlCol="0" fromWordArt="0" anchor="t" anchorCtr="0" forceAA="0" upright="0" compatLnSpc="0">
+          <a:bodyPr spcFirstLastPara="1" vertOverflow="overflow" horzOverflow="overflow" vert="horz" wrap="square" lIns="91423" tIns="91423" rIns="91423" bIns="91423" numCol="1" spcCol="0" rtlCol="0" fromWordArt="0" anchor="t" anchorCtr="0" forceAA="0" upright="0" compatLnSpc="0">
             <a:noAutofit/>
           </a:bodyPr>
           <a:lstStyle/>
@@ -15815,7 +15914,51 @@
                 <a:ea typeface="DM Sans"/>
                 <a:cs typeface="DM Sans"/>
               </a:rPr>
-              <a:t>This study investigates the extent to which BERT and RoBERTa encode ontological subsumption relations by replicating and comparing two state-of-the-art probing methodologies: LMAOSI (Language Model Analysis for Ontology Subsumption Inference) and PRONTO (Prompt-Based Detection of Semantic Containment Patterns).</a:t>
+              <a:t>This study investigates the extent to which BERT and RoBERTa encode ontological subsumption relations by </a:t>
+            </a:r>
+            <a:r>
+              <a:rPr lang="en-US" sz="1600" b="1" i="0" u="none" strike="noStrike" cap="none" spc="0">
+                <a:solidFill>
+                  <a:schemeClr val="dk1"/>
+                </a:solidFill>
+                <a:latin typeface="DM Sans"/>
+                <a:ea typeface="DM Sans"/>
+                <a:cs typeface="DM Sans"/>
+              </a:rPr>
+              <a:t>replicating and comparing two state-of-the-art probing methodologies: LMAOSI</a:t>
+            </a:r>
+            <a:r>
+              <a:rPr lang="en-US" sz="1600" b="0" i="0" u="none" strike="noStrike" cap="none" spc="0">
+                <a:solidFill>
+                  <a:schemeClr val="dk1"/>
+                </a:solidFill>
+                <a:latin typeface="DM Sans"/>
+                <a:ea typeface="DM Sans"/>
+                <a:cs typeface="DM Sans"/>
+              </a:rPr>
+              <a:t> (Language Model Analysis for Ontology Subsumption Inference) </a:t>
+            </a:r>
+            <a:r>
+              <a:rPr lang="en-US" sz="1600" b="1" i="0" u="none" strike="noStrike" cap="none" spc="0">
+                <a:solidFill>
+                  <a:schemeClr val="dk1"/>
+                </a:solidFill>
+                <a:latin typeface="DM Sans"/>
+                <a:ea typeface="DM Sans"/>
+                <a:cs typeface="DM Sans"/>
+              </a:rPr>
+              <a:t>and PRONTO</a:t>
+            </a:r>
+            <a:r>
+              <a:rPr lang="en-US" sz="1600" b="0" i="0" u="none" strike="noStrike" cap="none" spc="0">
+                <a:solidFill>
+                  <a:schemeClr val="dk1"/>
+                </a:solidFill>
+                <a:latin typeface="DM Sans"/>
+                <a:ea typeface="DM Sans"/>
+                <a:cs typeface="DM Sans"/>
+              </a:rPr>
+              <a:t> (Prompt-Based Detection of Semantic Containment Patterns).</a:t>
             </a:r>
             <a:endParaRPr lang="en" sz="1600"/>
           </a:p>
@@ -15906,7 +16049,7 @@
       </p:sp>
       <p:cxnSp>
         <p:nvCxnSpPr>
-          <p:cNvPr id="1906983933" name="Google Shape;166;p32"/>
+          <p:cNvPr id="373583820" name="Google Shape;166;p32"/>
           <p:cNvCxnSpPr/>
           <p:nvPr/>
         </p:nvCxnSpPr>
@@ -15965,7 +16108,7 @@
       </p:grpSpPr>
       <p:sp>
         <p:nvSpPr>
-          <p:cNvPr id="1782879497" name="Google Shape;133;p28"/>
+          <p:cNvPr id="1267271883" name="Google Shape;133;p28"/>
           <p:cNvSpPr txBox="1"/>
           <p:nvPr>
             <p:ph type="title"/>
@@ -16013,7 +16156,7 @@
       </p:sp>
       <p:sp>
         <p:nvSpPr>
-          <p:cNvPr id="701439793" name="Google Shape;134;p28"/>
+          <p:cNvPr id="1296694100" name="Google Shape;134;p28"/>
           <p:cNvSpPr txBox="1"/>
           <p:nvPr>
             <p:ph type="title" idx="2"/>
@@ -16054,7 +16197,7 @@
       </p:sp>
       <p:cxnSp>
         <p:nvCxnSpPr>
-          <p:cNvPr id="1872948689" name="Google Shape;136;p28"/>
+          <p:cNvPr id="911541302" name="Google Shape;136;p28"/>
           <p:cNvCxnSpPr/>
           <p:nvPr/>
         </p:nvCxnSpPr>
@@ -16113,7 +16256,7 @@
       </p:grpSpPr>
       <p:sp>
         <p:nvSpPr>
-          <p:cNvPr id="1633555106" name="Google Shape;106;p25"/>
+          <p:cNvPr id="643845865" name="Google Shape;106;p25"/>
           <p:cNvSpPr txBox="1"/>
           <p:nvPr>
             <p:ph type="title"/>
@@ -16167,7 +16310,7 @@
       </p:sp>
       <p:sp>
         <p:nvSpPr>
-          <p:cNvPr id="1403087233" name="Google Shape;107;p25"/>
+          <p:cNvPr id="1254223614" name="Google Shape;107;p25"/>
           <p:cNvSpPr txBox="1"/>
           <p:nvPr>
             <p:ph type="body" idx="1"/>
@@ -16176,14 +16319,14 @@
         <p:spPr bwMode="auto">
           <a:xfrm flipH="0" flipV="0">
             <a:off x="720000" y="863043"/>
-            <a:ext cx="7704000" cy="3923268"/>
+            <a:ext cx="7704000" cy="3923267"/>
           </a:xfrm>
           <a:prstGeom prst="rect">
             <a:avLst/>
           </a:prstGeom>
         </p:spPr>
         <p:txBody>
-          <a:bodyPr spcFirstLastPara="1" wrap="square" lIns="91424" tIns="91424" rIns="91424" bIns="91424" anchor="t" anchorCtr="0">
+          <a:bodyPr spcFirstLastPara="1" wrap="square" lIns="91423" tIns="91423" rIns="91423" bIns="91423" anchor="t" anchorCtr="0">
             <a:noAutofit/>
           </a:bodyPr>
           <a:lstStyle/>
@@ -16760,7 +16903,7 @@
       </p:sp>
       <p:pic>
         <p:nvPicPr>
-          <p:cNvPr id="117044406" name=""/>
+          <p:cNvPr id="1271762358" name=""/>
           <p:cNvPicPr>
             <a:picLocks noChangeAspect="1"/>
           </p:cNvPicPr>
@@ -16773,7 +16916,7 @@
         <p:spPr bwMode="auto">
           <a:xfrm flipH="0" flipV="0">
             <a:off x="2739299" y="1958783"/>
-            <a:ext cx="3857623" cy="2172684"/>
+            <a:ext cx="3857622" cy="2172684"/>
           </a:xfrm>
           <a:prstGeom prst="rect">
             <a:avLst/>
@@ -16815,7 +16958,7 @@
       </p:grpSpPr>
       <p:sp>
         <p:nvSpPr>
-          <p:cNvPr id="269760861" name="Google Shape;125;p27"/>
+          <p:cNvPr id="283467652" name="Google Shape;125;p27"/>
           <p:cNvSpPr txBox="1"/>
           <p:nvPr>
             <p:ph type="title"/>
@@ -16831,7 +16974,7 @@
           </a:prstGeom>
         </p:spPr>
         <p:txBody>
-          <a:bodyPr spcFirstLastPara="1" vertOverflow="overflow" horzOverflow="overflow" vert="horz" wrap="square" lIns="91424" tIns="91424" rIns="91424" bIns="91424" numCol="1" spcCol="0" rtlCol="0" fromWordArt="0" anchor="t" anchorCtr="0" forceAA="0" upright="0" compatLnSpc="0">
+          <a:bodyPr spcFirstLastPara="1" vertOverflow="overflow" horzOverflow="overflow" vert="horz" wrap="square" lIns="91423" tIns="91423" rIns="91423" bIns="91423" numCol="1" spcCol="0" rtlCol="0" fromWordArt="0" anchor="t" anchorCtr="0" forceAA="0" upright="0" compatLnSpc="0">
             <a:noAutofit/>
           </a:bodyPr>
           <a:lstStyle/>
@@ -16856,7 +16999,7 @@
       </p:sp>
       <p:sp>
         <p:nvSpPr>
-          <p:cNvPr id="759950591" name="Google Shape;127;p27"/>
+          <p:cNvPr id="1867980666" name="Google Shape;127;p27"/>
           <p:cNvSpPr txBox="1"/>
           <p:nvPr/>
         </p:nvSpPr>
@@ -16870,7 +17013,7 @@
           </a:prstGeom>
         </p:spPr>
         <p:txBody>
-          <a:bodyPr spcFirstLastPara="1" wrap="square" lIns="91424" tIns="91424" rIns="91424" bIns="91424" anchor="t" anchorCtr="0">
+          <a:bodyPr spcFirstLastPara="1" wrap="square" lIns="91423" tIns="91423" rIns="91423" bIns="91423" anchor="t" anchorCtr="0">
             <a:noAutofit/>
           </a:bodyPr>
           <a:lstStyle>
@@ -17374,7 +17517,7 @@
       </p:sp>
       <p:pic>
         <p:nvPicPr>
-          <p:cNvPr id="1041895653" name=""/>
+          <p:cNvPr id="1577737317" name=""/>
           <p:cNvPicPr>
             <a:picLocks noChangeAspect="1"/>
           </p:cNvPicPr>
@@ -17396,7 +17539,7 @@
       </p:pic>
       <p:pic>
         <p:nvPicPr>
-          <p:cNvPr id="1113631585" name=""/>
+          <p:cNvPr id="1978861065" name=""/>
           <p:cNvPicPr>
             <a:picLocks noChangeAspect="1"/>
           </p:cNvPicPr>
@@ -17418,7 +17561,7 @@
       </p:pic>
       <p:pic>
         <p:nvPicPr>
-          <p:cNvPr id="1532894745" name=""/>
+          <p:cNvPr id="24417598" name=""/>
           <p:cNvPicPr>
             <a:picLocks noChangeAspect="1"/>
           </p:cNvPicPr>
@@ -17440,7 +17583,7 @@
       </p:pic>
       <p:cxnSp>
         <p:nvCxnSpPr>
-          <p:cNvPr id="1488101039" name=""/>
+          <p:cNvPr id="115610833" name=""/>
           <p:cNvCxnSpPr/>
           <p:nvPr/>
         </p:nvCxnSpPr>
@@ -17472,7 +17615,7 @@
       </p:cxnSp>
       <p:pic>
         <p:nvPicPr>
-          <p:cNvPr id="308444685" name=""/>
+          <p:cNvPr id="1591578606" name=""/>
           <p:cNvPicPr>
             <a:picLocks noChangeAspect="1"/>
           </p:cNvPicPr>
@@ -17494,7 +17637,7 @@
       </p:pic>
       <p:sp>
         <p:nvSpPr>
-          <p:cNvPr id="447650903" name=""/>
+          <p:cNvPr id="1239969638" name=""/>
           <p:cNvSpPr txBox="1"/>
           <p:nvPr/>
         </p:nvSpPr>
@@ -17597,7 +17740,7 @@
       </p:sp>
       <p:sp>
         <p:nvSpPr>
-          <p:cNvPr id="1164665526" name="Google Shape;125;p27"/>
+          <p:cNvPr id="1675452317" name="Google Shape;125;p27"/>
           <p:cNvSpPr txBox="1"/>
           <p:nvPr/>
         </p:nvSpPr>
@@ -17611,7 +17754,7 @@
           </a:prstGeom>
         </p:spPr>
         <p:txBody>
-          <a:bodyPr spcFirstLastPara="1" vertOverflow="overflow" horzOverflow="overflow" vert="horz" wrap="square" lIns="91424" tIns="91424" rIns="91424" bIns="91424" numCol="1" spcCol="0" rtlCol="0" fromWordArt="0" anchor="t" anchorCtr="0" forceAA="0" upright="0" compatLnSpc="0">
+          <a:bodyPr spcFirstLastPara="1" vertOverflow="overflow" horzOverflow="overflow" vert="horz" wrap="square" lIns="91423" tIns="91423" rIns="91423" bIns="91423" numCol="1" spcCol="0" rtlCol="0" fromWordArt="0" anchor="t" anchorCtr="0" forceAA="0" upright="0" compatLnSpc="0">
             <a:noAutofit/>
           </a:bodyPr>
           <a:lstStyle>
@@ -17906,7 +18049,7 @@
       </p:grpSpPr>
       <p:sp>
         <p:nvSpPr>
-          <p:cNvPr id="239386225" name="Google Shape;106;p25"/>
+          <p:cNvPr id="1274585569" name="Google Shape;106;p25"/>
           <p:cNvSpPr txBox="1"/>
           <p:nvPr>
             <p:ph type="title"/>
@@ -17922,7 +18065,7 @@
           </a:prstGeom>
         </p:spPr>
         <p:txBody>
-          <a:bodyPr spcFirstLastPara="1" wrap="square" lIns="91424" tIns="91424" rIns="91424" bIns="91424" anchor="t" anchorCtr="0">
+          <a:bodyPr spcFirstLastPara="1" wrap="square" lIns="91423" tIns="91423" rIns="91423" bIns="91423" anchor="t" anchorCtr="0">
             <a:noAutofit/>
           </a:bodyPr>
           <a:lstStyle/>
@@ -17954,7 +18097,7 @@
       </p:sp>
       <p:sp>
         <p:nvSpPr>
-          <p:cNvPr id="721253258" name="Google Shape;107;p25"/>
+          <p:cNvPr id="1698377421" name="Google Shape;107;p25"/>
           <p:cNvSpPr txBox="1"/>
           <p:nvPr>
             <p:ph type="body" idx="1"/>
@@ -17970,14 +18113,14 @@
           </a:prstGeom>
         </p:spPr>
         <p:txBody>
-          <a:bodyPr spcFirstLastPara="1" wrap="square" lIns="91424" tIns="91424" rIns="91424" bIns="91424" anchor="t" anchorCtr="0">
+          <a:bodyPr spcFirstLastPara="1" wrap="square" lIns="91423" tIns="91423" rIns="91423" bIns="91423" anchor="t" anchorCtr="0">
             <a:noAutofit/>
           </a:bodyPr>
           <a:lstStyle/>
           <a:p>
             <a:pPr marL="0" marR="0" lvl="0" indent="0" algn="l" rtl="0">
               <a:lnSpc>
-                <a:spcPct val="200000"/>
+                <a:spcPct val="100000"/>
               </a:lnSpc>
               <a:spcBef>
                 <a:spcPts val="0"/>
@@ -17995,7 +18138,7 @@
             </a:pPr>
             <a:r>
               <a:rPr lang="it-IT"/>
-              <a:t>Since we are trying to replicate results from both papers and those 2 papers use a different prompt style, instead of using multiple prompts from a single paper we decide to use </a:t>
+              <a:t>Since we are trying to replicate results from both papers, and those 2 papers use a different prompt style, instead of using multiple prompts from a single paper we decide to use </a:t>
             </a:r>
             <a:r>
               <a:rPr lang="it-IT" b="1"/>
@@ -18046,7 +18189,7 @@
           <a:p>
             <a:pPr marL="0" marR="0" lvl="0" indent="0" algn="l" rtl="0">
               <a:lnSpc>
-                <a:spcPct val="200000"/>
+                <a:spcPct val="100000"/>
               </a:lnSpc>
               <a:spcBef>
                 <a:spcPts val="0"/>
@@ -18071,7 +18214,7 @@
           <a:p>
             <a:pPr lvl="0" algn="l" rtl="0">
               <a:lnSpc>
-                <a:spcPct val="200000"/>
+                <a:spcPct val="100000"/>
               </a:lnSpc>
               <a:spcBef>
                 <a:spcPts val="0"/>
@@ -18096,7 +18239,7 @@
           <a:p>
             <a:pPr lvl="0" algn="l" rtl="0">
               <a:lnSpc>
-                <a:spcPct val="200000"/>
+                <a:spcPct val="100000"/>
               </a:lnSpc>
               <a:spcBef>
                 <a:spcPts val="0"/>
@@ -18120,6 +18263,9 @@
           </a:p>
           <a:p>
             <a:pPr>
+              <a:lnSpc>
+                <a:spcPct val="100000"/>
+              </a:lnSpc>
               <a:defRPr/>
             </a:pPr>
             <a:endParaRPr/>
@@ -18128,7 +18274,7 @@
       </p:sp>
       <p:pic>
         <p:nvPicPr>
-          <p:cNvPr id="557696712" name=""/>
+          <p:cNvPr id="72182466" name=""/>
           <p:cNvPicPr>
             <a:picLocks noChangeAspect="1"/>
           </p:cNvPicPr>
@@ -18150,7 +18296,7 @@
       </p:pic>
       <p:pic>
         <p:nvPicPr>
-          <p:cNvPr id="798890483" name=""/>
+          <p:cNvPr id="2132618812" name=""/>
           <p:cNvPicPr>
             <a:picLocks noChangeAspect="1"/>
           </p:cNvPicPr>
@@ -18172,7 +18318,7 @@
       </p:pic>
       <p:sp>
         <p:nvSpPr>
-          <p:cNvPr id="1201053427" name=""/>
+          <p:cNvPr id="2003019885" name=""/>
           <p:cNvSpPr txBox="1"/>
           <p:nvPr/>
         </p:nvSpPr>
@@ -18204,7 +18350,7 @@
       </p:sp>
       <p:sp>
         <p:nvSpPr>
-          <p:cNvPr id="1484765323" name=""/>
+          <p:cNvPr id="2047645786" name=""/>
           <p:cNvSpPr/>
           <p:nvPr/>
         </p:nvSpPr>
@@ -18300,7 +18446,7 @@
       </p:sp>
       <p:sp>
         <p:nvSpPr>
-          <p:cNvPr id="545518523" name=""/>
+          <p:cNvPr id="1883623926" name=""/>
           <p:cNvSpPr txBox="1"/>
           <p:nvPr/>
         </p:nvSpPr>
@@ -18332,14 +18478,14 @@
       </p:sp>
       <p:sp>
         <p:nvSpPr>
-          <p:cNvPr id="56869480" name=""/>
+          <p:cNvPr id="2003384017" name=""/>
           <p:cNvSpPr/>
           <p:nvPr/>
         </p:nvSpPr>
         <p:spPr bwMode="auto">
           <a:xfrm flipH="0" flipV="0">
             <a:off x="4561320" y="2928937"/>
-            <a:ext cx="3739282" cy="366119"/>
+            <a:ext cx="3739281" cy="366119"/>
           </a:xfrm>
         </p:spPr>
         <p:txBody>
@@ -18465,28 +18611,6 @@
           </a:p>
         </p:txBody>
       </p:sp>
-      <p:pic>
-        <p:nvPicPr>
-          <p:cNvPr id="1659172154" name=""/>
-          <p:cNvPicPr>
-            <a:picLocks noChangeAspect="1"/>
-          </p:cNvPicPr>
-          <p:nvPr/>
-        </p:nvPicPr>
-        <p:blipFill rotWithShape="1">
-          <a:blip r:embed="rId3"/>
-          <a:stretch/>
-        </p:blipFill>
-        <p:spPr bwMode="auto">
-          <a:xfrm>
-            <a:off x="0" y="0"/>
-            <a:ext cx="4429125" cy="4429125"/>
-          </a:xfrm>
-          <a:prstGeom prst="rect">
-            <a:avLst/>
-          </a:prstGeom>
-        </p:spPr>
-      </p:pic>
     </p:spTree>
   </p:cSld>
   <p:clrMapOvr>
@@ -18522,7 +18646,7 @@
       </p:grpSpPr>
       <p:sp>
         <p:nvSpPr>
-          <p:cNvPr id="1321206215" name="Google Shape;133;p28"/>
+          <p:cNvPr id="2131814054" name="Google Shape;133;p28"/>
           <p:cNvSpPr txBox="1"/>
           <p:nvPr>
             <p:ph type="title"/>
@@ -18538,7 +18662,7 @@
           </a:prstGeom>
         </p:spPr>
         <p:txBody>
-          <a:bodyPr spcFirstLastPara="1" vertOverflow="overflow" horzOverflow="overflow" vert="horz" wrap="square" lIns="91424" tIns="91424" rIns="91424" bIns="91424" numCol="1" spcCol="0" rtlCol="0" fromWordArt="0" anchor="ctr" anchorCtr="0" forceAA="0" upright="0" compatLnSpc="0">
+          <a:bodyPr spcFirstLastPara="1" vertOverflow="overflow" horzOverflow="overflow" vert="horz" wrap="square" lIns="91423" tIns="91423" rIns="91423" bIns="91423" numCol="1" spcCol="0" rtlCol="0" fromWordArt="0" anchor="ctr" anchorCtr="0" forceAA="0" upright="0" compatLnSpc="0">
             <a:noAutofit/>
           </a:bodyPr>
           <a:lstStyle/>
@@ -18563,7 +18687,7 @@
       </p:sp>
       <p:sp>
         <p:nvSpPr>
-          <p:cNvPr id="1219573134" name="Google Shape;134;p28"/>
+          <p:cNvPr id="797510244" name="Google Shape;134;p28"/>
           <p:cNvSpPr txBox="1"/>
           <p:nvPr>
             <p:ph type="title" idx="2"/>
@@ -18579,7 +18703,7 @@
           </a:prstGeom>
         </p:spPr>
         <p:txBody>
-          <a:bodyPr spcFirstLastPara="1" wrap="square" lIns="91424" tIns="91424" rIns="91424" bIns="91424" anchor="ctr" anchorCtr="0">
+          <a:bodyPr spcFirstLastPara="1" wrap="square" lIns="91423" tIns="91423" rIns="91423" bIns="91423" anchor="ctr" anchorCtr="0">
             <a:noAutofit/>
           </a:bodyPr>
           <a:lstStyle/>
@@ -18608,7 +18732,7 @@
       </p:sp>
       <p:sp>
         <p:nvSpPr>
-          <p:cNvPr id="1973134766" name="Google Shape;135;p28"/>
+          <p:cNvPr id="1404419038" name="Google Shape;135;p28"/>
           <p:cNvSpPr txBox="1"/>
           <p:nvPr>
             <p:ph type="subTitle" idx="1"/>
@@ -18624,7 +18748,7 @@
           </a:prstGeom>
         </p:spPr>
         <p:txBody>
-          <a:bodyPr spcFirstLastPara="1" vertOverflow="overflow" horzOverflow="overflow" vert="horz" wrap="square" lIns="91424" tIns="91424" rIns="91424" bIns="91424" numCol="1" spcCol="0" rtlCol="0" fromWordArt="0" anchor="t" anchorCtr="0" forceAA="0" upright="0" compatLnSpc="0">
+          <a:bodyPr spcFirstLastPara="1" vertOverflow="overflow" horzOverflow="overflow" vert="horz" wrap="square" lIns="91423" tIns="91423" rIns="91423" bIns="91423" numCol="1" spcCol="0" rtlCol="0" fromWordArt="0" anchor="t" anchorCtr="0" forceAA="0" upright="0" compatLnSpc="0">
             <a:noAutofit/>
           </a:bodyPr>
           <a:lstStyle/>
@@ -18709,7 +18833,7 @@
       </p:sp>
       <p:cxnSp>
         <p:nvCxnSpPr>
-          <p:cNvPr id="446679149" name="Google Shape;136;p28"/>
+          <p:cNvPr id="292818754" name="Google Shape;136;p28"/>
           <p:cNvCxnSpPr/>
           <p:nvPr/>
         </p:nvCxnSpPr>
@@ -18735,14 +18859,14 @@
       </p:cxnSp>
       <p:sp>
         <p:nvSpPr>
-          <p:cNvPr id="388928687" name=""/>
+          <p:cNvPr id="77936848" name=""/>
           <p:cNvSpPr/>
           <p:nvPr/>
         </p:nvSpPr>
         <p:spPr bwMode="auto">
-          <a:xfrm>
-            <a:off x="2795532" y="1846720"/>
-            <a:ext cx="4136233" cy="253824"/>
+          <a:xfrm flipH="0" flipV="0">
+            <a:off x="3434709" y="1789992"/>
+            <a:ext cx="4989758" cy="253824"/>
           </a:xfrm>
         </p:spPr>
         <p:txBody>
@@ -18751,7 +18875,7 @@
             <a:spAutoFit/>
           </a:bodyPr>
           <a:p>
-            <a:pPr>
+            <a:pPr algn="r">
               <a:defRPr/>
             </a:pPr>
             <a:r>
@@ -18763,7 +18887,29 @@
                 <a:ea typeface="Droid Sans Mono"/>
                 <a:cs typeface="Droid Sans Mono"/>
               </a:rPr>
-              <a:t>prompt → MLM (frozen) → logits → manual verbalizer → label</a:t>
+              <a:t>prompt → MLM (frozen) → </a:t>
+            </a:r>
+            <a:r>
+              <a:rPr lang="it-IT" sz="1050" b="1" i="0" u="none">
+                <a:solidFill>
+                  <a:schemeClr val="tx1"/>
+                </a:solidFill>
+                <a:latin typeface="Droid Sans Mono"/>
+                <a:ea typeface="Droid Sans Mono"/>
+                <a:cs typeface="Droid Sans Mono"/>
+              </a:rPr>
+              <a:t>prediction </a:t>
+            </a:r>
+            <a:r>
+              <a:rPr sz="1050" b="1" i="0" u="none">
+                <a:solidFill>
+                  <a:schemeClr val="tx1"/>
+                </a:solidFill>
+                <a:latin typeface="Droid Sans Mono"/>
+                <a:ea typeface="Droid Sans Mono"/>
+                <a:cs typeface="Droid Sans Mono"/>
+              </a:rPr>
+              <a:t>→ manual verbalizer → label</a:t>
             </a:r>
             <a:endParaRPr b="1">
               <a:solidFill>
@@ -18775,14 +18921,14 @@
       </p:sp>
       <p:graphicFrame>
         <p:nvGraphicFramePr>
-          <p:cNvPr id="2101259649" name=""/>
+          <p:cNvPr id="983640034" name=""/>
           <p:cNvGraphicFramePr>
             <a:graphicFrameLocks xmlns:a="http://schemas.openxmlformats.org/drawingml/2006/main"/>
           </p:cNvGraphicFramePr>
           <p:nvPr/>
         </p:nvGraphicFramePr>
-        <p:xfrm>
-          <a:off x="1571624" y="2957512"/>
+        <p:xfrm rot="0">
+          <a:off x="1571623" y="2957512"/>
           <a:ext cx="6102349" cy="1745739"/>
         </p:xfrm>
         <a:graphic>
@@ -20781,7 +20927,7 @@
       </p:grpSpPr>
       <p:sp>
         <p:nvSpPr>
-          <p:cNvPr id="52600452" name="Google Shape;106;p25"/>
+          <p:cNvPr id="415325374" name="Google Shape;106;p25"/>
           <p:cNvSpPr txBox="1"/>
           <p:nvPr>
             <p:ph type="title"/>
@@ -20797,7 +20943,7 @@
           </a:prstGeom>
         </p:spPr>
         <p:txBody>
-          <a:bodyPr spcFirstLastPara="1" wrap="square" lIns="91424" tIns="91424" rIns="91424" bIns="91424" anchor="t" anchorCtr="0">
+          <a:bodyPr spcFirstLastPara="1" wrap="square" lIns="91423" tIns="91423" rIns="91423" bIns="91423" anchor="t" anchorCtr="0">
             <a:noAutofit/>
           </a:bodyPr>
           <a:lstStyle/>
@@ -20822,7 +20968,7 @@
       </p:sp>
       <p:sp>
         <p:nvSpPr>
-          <p:cNvPr id="199346850" name="Google Shape;107;p25"/>
+          <p:cNvPr id="415528744" name="Google Shape;107;p25"/>
           <p:cNvSpPr txBox="1"/>
           <p:nvPr>
             <p:ph type="body" idx="1"/>
@@ -20830,7 +20976,7 @@
         </p:nvSpPr>
         <p:spPr bwMode="auto">
           <a:xfrm flipH="0" flipV="0">
-            <a:off x="720000" y="922574"/>
+            <a:off x="720000" y="922573"/>
             <a:ext cx="7704000" cy="3768487"/>
           </a:xfrm>
           <a:prstGeom prst="rect">
@@ -20838,7 +20984,7 @@
           </a:prstGeom>
         </p:spPr>
         <p:txBody>
-          <a:bodyPr spcFirstLastPara="1" wrap="square" lIns="91424" tIns="91424" rIns="91424" bIns="91424" anchor="t" anchorCtr="0">
+          <a:bodyPr spcFirstLastPara="1" wrap="square" lIns="91423" tIns="91423" rIns="91423" bIns="91423" anchor="t" anchorCtr="0">
             <a:noAutofit/>
           </a:bodyPr>
           <a:lstStyle/>
@@ -20855,9 +21001,22 @@
             </a:pPr>
             <a:r>
               <a:rPr lang="it-IT"/>
-              <a:t>As said before: by following LMAOSI’s paper first experiment we implement some 0-shot verbalizers. Wich means keeping the whole model (Bert / RoBerta) for prediction of &lt;mask&gt; token.  .</a:t>
+              <a:t>As said before: by following LMAOSI’s paper first experiment we implement some 0-shot verbalizers. Wich means keeping the whole model (Bert / RoBerta) for prediction of &lt;mask&gt; token. </a:t>
             </a:r>
             <a:endParaRPr lang="it-IT"/>
+          </a:p>
+          <a:p>
+            <a:pPr marL="0" lvl="0" indent="0" algn="l" rtl="0">
+              <a:spcBef>
+                <a:spcPts val="0"/>
+              </a:spcBef>
+              <a:spcAft>
+                <a:spcPts val="0"/>
+              </a:spcAft>
+              <a:buNone/>
+              <a:defRPr/>
+            </a:pPr>
+            <a:endParaRPr/>
           </a:p>
           <a:p>
             <a:pPr marL="0" lvl="0" indent="0" algn="l" rtl="0">
@@ -21187,7 +21346,7 @@
                 <a:ea typeface="DM Sans"/>
                 <a:cs typeface="DM Sans"/>
               </a:rPr>
-              <a:t>. From here we will try and validate said hypotesis with following experiments</a:t>
+              <a:t>. From here we will try and validate said hypotesis with following experiments.</a:t>
             </a:r>
             <a:endParaRPr/>
           </a:p>
@@ -21195,14 +21354,14 @@
       </p:sp>
       <p:graphicFrame>
         <p:nvGraphicFramePr>
-          <p:cNvPr id="840102915" name="Google Shape;108;p25"/>
+          <p:cNvPr id="102294594" name="Google Shape;108;p25"/>
           <p:cNvGraphicFramePr>
             <a:graphicFrameLocks xmlns:a="http://schemas.openxmlformats.org/drawingml/2006/main"/>
           </p:cNvGraphicFramePr>
           <p:nvPr/>
         </p:nvGraphicFramePr>
         <p:xfrm rot="0">
-          <a:off x="1132312" y="1778705"/>
+          <a:off x="1132311" y="1628310"/>
           <a:ext cx="6294984" cy="1459049"/>
         </p:xfrm>
         <a:graphic>
@@ -21242,7 +21401,7 @@
                       </a:endParaRPr>
                     </a:p>
                   </a:txBody>
-                  <a:tcPr marL="91424" marR="91424" marT="0" marB="0" anchor="ctr">
+                  <a:tcPr marL="91423" marR="91423" marT="0" marB="0" anchor="ctr">
                     <a:lnL w="9524" algn="ctr">
                       <a:solidFill>
                         <a:schemeClr val="dk1"/>
@@ -21303,7 +21462,7 @@
                       </a:endParaRPr>
                     </a:p>
                   </a:txBody>
-                  <a:tcPr marL="91424" marR="91424" marT="0" marB="0" anchor="ctr">
+                  <a:tcPr marL="91423" marR="91423" marT="0" marB="0" anchor="ctr">
                     <a:lnL w="9524" algn="ctr">
                       <a:solidFill>
                         <a:schemeClr val="dk1"/>
@@ -21364,7 +21523,7 @@
                       </a:endParaRPr>
                     </a:p>
                   </a:txBody>
-                  <a:tcPr marL="91424" marR="91424" marT="0" marB="0" anchor="ctr">
+                  <a:tcPr marL="91423" marR="91423" marT="0" marB="0" anchor="ctr">
                     <a:lnL w="9524" algn="ctr">
                       <a:solidFill>
                         <a:schemeClr val="dk1"/>
@@ -21427,7 +21586,7 @@
                       </a:endParaRPr>
                     </a:p>
                   </a:txBody>
-                  <a:tcPr marL="91424" marR="91424" marT="0" marB="0" anchor="ctr">
+                  <a:tcPr marL="91423" marR="91423" marT="0" marB="0" anchor="ctr">
                     <a:lnL w="9524" algn="ctr">
                       <a:solidFill>
                         <a:schemeClr val="dk1"/>
@@ -21469,7 +21628,7 @@
                       <a:endParaRPr sz="1200" b="0"/>
                     </a:p>
                   </a:txBody>
-                  <a:tcPr marL="91424" marR="91424" marT="0" marB="0" anchor="ctr">
+                  <a:tcPr marL="91423" marR="91423" marT="0" marB="0" anchor="ctr">
                     <a:lnL w="9524" algn="ctr">
                       <a:solidFill>
                         <a:schemeClr val="dk1"/>
@@ -21511,7 +21670,7 @@
                       <a:endParaRPr sz="1200" b="0"/>
                     </a:p>
                   </a:txBody>
-                  <a:tcPr marL="91424" marR="91424" marT="0" marB="0" anchor="ctr">
+                  <a:tcPr marL="91423" marR="91423" marT="0" marB="0" anchor="ctr">
                     <a:lnL w="9524" algn="ctr">
                       <a:solidFill>
                         <a:schemeClr val="dk1"/>
@@ -21576,7 +21735,7 @@
                       </a:endParaRPr>
                     </a:p>
                   </a:txBody>
-                  <a:tcPr marL="91424" marR="91424" marT="0" marB="0" anchor="ctr">
+                  <a:tcPr marL="91423" marR="91423" marT="0" marB="0" anchor="ctr">
                     <a:lnL w="9524" algn="ctr">
                       <a:solidFill>
                         <a:schemeClr val="dk1"/>
@@ -21618,7 +21777,7 @@
                       <a:endParaRPr sz="1200" b="0"/>
                     </a:p>
                   </a:txBody>
-                  <a:tcPr marL="91424" marR="91424" marT="0" marB="0" anchor="ctr">
+                  <a:tcPr marL="91423" marR="91423" marT="0" marB="0" anchor="ctr">
                     <a:lnL w="9524" algn="ctr">
                       <a:solidFill>
                         <a:schemeClr val="dk1"/>
@@ -21678,7 +21837,7 @@
                       <a:endParaRPr sz="1200" b="0"/>
                     </a:p>
                   </a:txBody>
-                  <a:tcPr marL="91424" marR="91424" marT="0" marB="0" anchor="ctr">
+                  <a:tcPr marL="91423" marR="91423" marT="0" marB="0" anchor="ctr">
                     <a:lnL w="9524" algn="ctr">
                       <a:solidFill>
                         <a:schemeClr val="dk1"/>
@@ -21743,7 +21902,7 @@
                       </a:endParaRPr>
                     </a:p>
                   </a:txBody>
-                  <a:tcPr marL="91424" marR="91424" marT="0" marB="0" anchor="ctr">
+                  <a:tcPr marL="91423" marR="91423" marT="0" marB="0" anchor="ctr">
                     <a:lnL w="9524" algn="ctr">
                       <a:solidFill>
                         <a:schemeClr val="dk1"/>
@@ -21806,7 +21965,7 @@
                       </a:endParaRPr>
                     </a:p>
                   </a:txBody>
-                  <a:tcPr marL="91424" marR="91424" marT="0" marB="0" anchor="ctr">
+                  <a:tcPr marL="91423" marR="91423" marT="0" marB="0" anchor="ctr">
                     <a:lnL w="9524" algn="ctr">
                       <a:solidFill>
                         <a:schemeClr val="dk1"/>
@@ -21880,7 +22039,7 @@
                       </a:endParaRPr>
                     </a:p>
                   </a:txBody>
-                  <a:tcPr marL="91424" marR="91424" marT="0" marB="0" anchor="ctr">
+                  <a:tcPr marL="91423" marR="91423" marT="0" marB="0" anchor="ctr">
                     <a:lnL w="9524" algn="ctr">
                       <a:solidFill>
                         <a:schemeClr val="dk1"/>

</xml_diff>